<commit_message>
[UPD] : update of section 2.3 command line
</commit_message>
<xml_diff>
--- a/doc/StationMeteo_Soutenance_Stephane.pptx
+++ b/doc/StationMeteo_Soutenance_Stephane.pptx
@@ -5,10 +5,10 @@
     <p:sldMasterId id="2147483673" r:id="rId1"/>
   </p:sldMasterIdLst>
   <p:notesMasterIdLst>
-    <p:notesMasterId r:id="rId44"/>
+    <p:notesMasterId r:id="rId45"/>
   </p:notesMasterIdLst>
   <p:handoutMasterIdLst>
-    <p:handoutMasterId r:id="rId45"/>
+    <p:handoutMasterId r:id="rId46"/>
   </p:handoutMasterIdLst>
   <p:sldIdLst>
     <p:sldId id="257" r:id="rId2"/>
@@ -43,16 +43,17 @@
     <p:sldId id="296" r:id="rId31"/>
     <p:sldId id="297" r:id="rId32"/>
     <p:sldId id="300" r:id="rId33"/>
-    <p:sldId id="304" r:id="rId34"/>
-    <p:sldId id="303" r:id="rId35"/>
-    <p:sldId id="305" r:id="rId36"/>
-    <p:sldId id="306" r:id="rId37"/>
-    <p:sldId id="307" r:id="rId38"/>
-    <p:sldId id="308" r:id="rId39"/>
-    <p:sldId id="302" r:id="rId40"/>
-    <p:sldId id="269" r:id="rId41"/>
-    <p:sldId id="271" r:id="rId42"/>
-    <p:sldId id="270" r:id="rId43"/>
+    <p:sldId id="309" r:id="rId34"/>
+    <p:sldId id="304" r:id="rId35"/>
+    <p:sldId id="303" r:id="rId36"/>
+    <p:sldId id="305" r:id="rId37"/>
+    <p:sldId id="306" r:id="rId38"/>
+    <p:sldId id="307" r:id="rId39"/>
+    <p:sldId id="308" r:id="rId40"/>
+    <p:sldId id="302" r:id="rId41"/>
+    <p:sldId id="269" r:id="rId42"/>
+    <p:sldId id="271" r:id="rId43"/>
+    <p:sldId id="270" r:id="rId44"/>
   </p:sldIdLst>
   <p:sldSz cx="12192000" cy="6858000"/>
   <p:notesSz cx="6858000" cy="9144000"/>
@@ -14044,7 +14045,7 @@
         </p:spPr>
         <p:txBody>
           <a:bodyPr>
-            <a:normAutofit/>
+            <a:normAutofit lnSpcReduction="10000"/>
           </a:bodyPr>
           <a:lstStyle/>
           <a:p>
@@ -14117,6 +14118,15 @@
             <a:r>
               <a:rPr lang="fr-FR" dirty="0"/>
               <a:t>2.2 Mettre au point les modules possible (le capteur n’est pas dispo sur Windows) avec navigateurs externe en IP locale</a:t>
+            </a:r>
+          </a:p>
+          <a:p>
+            <a:pPr marL="822960" lvl="3" indent="0">
+              <a:buNone/>
+            </a:pPr>
+            <a:r>
+              <a:rPr lang="fr-FR" dirty="0"/>
+              <a:t>2,3 Mettre au point le point d’entrée du programme serveur</a:t>
             </a:r>
           </a:p>
           <a:p>
@@ -17777,19 +17787,24 @@
         <p:spPr>
           <a:xfrm>
             <a:off x="1066800" y="642594"/>
-            <a:ext cx="10645674" cy="556814"/>
+            <a:ext cx="10058400" cy="556814"/>
           </a:xfrm>
         </p:spPr>
         <p:txBody>
           <a:bodyPr>
-            <a:normAutofit fontScale="90000"/>
+            <a:normAutofit/>
           </a:bodyPr>
           <a:lstStyle/>
           <a:p>
             <a:r>
               <a:rPr lang="fr-FR" sz="2000" dirty="0"/>
-              <a:t>3.1) Linux : Mettre au point du module du capteur et Tester le serveur en interne et externe</a:t>
-            </a:r>
+              <a:t>2.3) </a:t>
+            </a:r>
+            <a:r>
+              <a:rPr lang="fr-FR" sz="2200" dirty="0"/>
+              <a:t>Windows : point le point d’entrée du programme serveur</a:t>
+            </a:r>
+            <a:endParaRPr lang="fr-FR" sz="2000" dirty="0"/>
           </a:p>
         </p:txBody>
       </p:sp>
@@ -17812,7 +17827,7 @@
         <p:spPr>
           <a:xfrm>
             <a:off x="1066800" y="1300348"/>
-            <a:ext cx="10529190" cy="5042210"/>
+            <a:ext cx="9265338" cy="5042210"/>
           </a:xfrm>
         </p:spPr>
         <p:txBody>
@@ -17821,127 +17836,44 @@
           </a:bodyPr>
           <a:lstStyle/>
           <a:p>
-            <a:r>
-              <a:rPr lang="fr-FR" sz="1200" dirty="0"/>
-              <a:t>Connection en SSH sur le Raspberry PI</a:t>
-            </a:r>
-          </a:p>
-          <a:p>
-            <a:r>
-              <a:rPr lang="fr-FR" sz="1200" dirty="0"/>
-              <a:t>Vérifier que les outils de </a:t>
-            </a:r>
-            <a:r>
-              <a:rPr lang="fr-FR" sz="1200" dirty="0" err="1"/>
-              <a:t>Build</a:t>
-            </a:r>
-            <a:r>
-              <a:rPr lang="fr-FR" sz="1200" dirty="0"/>
-              <a:t> sont installée et que le module I2C est chargé et démarre bien automatiquement avec le Raspberry pi </a:t>
-            </a:r>
-          </a:p>
-          <a:p>
-            <a:r>
-              <a:rPr lang="fr-FR" sz="1200" dirty="0"/>
-              <a:t>Module BME280 :</a:t>
-            </a:r>
-          </a:p>
-          <a:p>
-            <a:pPr lvl="1"/>
-            <a:r>
-              <a:rPr lang="fr-FR" sz="1200" dirty="0"/>
-              <a:t>Vérification que la mesure ce fait et que le retour est conforme au script python fourni par AJC en référence</a:t>
-            </a:r>
-          </a:p>
-          <a:p>
-            <a:pPr lvl="1"/>
-            <a:r>
-              <a:rPr lang="fr-FR" sz="1200" dirty="0"/>
-              <a:t>Vérification que le format JSON est correct</a:t>
-            </a:r>
-          </a:p>
-          <a:p>
-            <a:pPr lvl="1"/>
-            <a:endParaRPr lang="fr-FR" sz="1200" dirty="0"/>
-          </a:p>
-          <a:p>
-            <a:r>
-              <a:rPr lang="fr-FR" sz="1400" dirty="0"/>
-              <a:t>Vérification que le programme fonctionne correctement :</a:t>
-            </a:r>
-          </a:p>
-          <a:p>
-            <a:pPr lvl="1"/>
-            <a:r>
-              <a:rPr lang="fr-FR" sz="1200" dirty="0"/>
-              <a:t>Démarrage de l’écoute du port 80 et test avec un navigateur sur IP localhost (127.0.0.1)</a:t>
-            </a:r>
-          </a:p>
-          <a:p>
-            <a:pPr lvl="2"/>
-            <a:r>
-              <a:rPr lang="fr-FR" dirty="0"/>
-              <a:t>Le port HTTP par default a savoir le 80 étant un port protégé ( ports de 0 à 1024), </a:t>
-            </a:r>
-          </a:p>
-          <a:p>
-            <a:pPr marL="822960" lvl="3" indent="0">
+            <a:pPr marL="0" indent="0">
               <a:buNone/>
             </a:pPr>
             <a:r>
-              <a:rPr lang="fr-FR" sz="1200" dirty="0"/>
-              <a:t>	   il faut démarrer le serveur avec les privilèges </a:t>
-            </a:r>
-            <a:r>
-              <a:rPr lang="fr-FR" dirty="0"/>
-              <a:t>Administrateur</a:t>
-            </a:r>
-            <a:r>
-              <a:rPr lang="fr-FR" sz="1200" dirty="0"/>
-              <a:t>.</a:t>
-            </a:r>
-          </a:p>
-          <a:p>
-            <a:pPr lvl="2"/>
-            <a:r>
-              <a:rPr lang="fr-FR" sz="1100" dirty="0"/>
-              <a:t>Connection a l’url </a:t>
-            </a:r>
-            <a:r>
-              <a:rPr lang="fr-FR" sz="1100" dirty="0">
-                <a:hlinkClick r:id="rId2"/>
-              </a:rPr>
-              <a:t>http://78.199.78.207:48001</a:t>
-            </a:r>
-            <a:endParaRPr lang="fr-FR" sz="1100" dirty="0"/>
-          </a:p>
-          <a:p>
-            <a:pPr lvl="2"/>
-            <a:r>
-              <a:rPr lang="fr-FR" sz="1100" dirty="0"/>
-              <a:t>Vérification que les différente url renvoient bien le bon contenu</a:t>
-            </a:r>
-          </a:p>
-          <a:p>
-            <a:pPr lvl="1"/>
-            <a:r>
-              <a:rPr lang="fr-FR" sz="1200" dirty="0"/>
-              <a:t>Validation de la partie base de donnée :</a:t>
-            </a:r>
-          </a:p>
-          <a:p>
-            <a:pPr lvl="2"/>
-            <a:r>
-              <a:rPr lang="fr-FR" sz="1100" dirty="0"/>
-              <a:t>Vérification que le fichier de BD est bien créé au bon endroit</a:t>
-            </a:r>
-          </a:p>
-          <a:p>
-            <a:pPr lvl="1"/>
-            <a:r>
-              <a:rPr lang="fr-FR" sz="1200" dirty="0"/>
-              <a:t>Test des différentes options du serveur en ligne de commandes</a:t>
-            </a:r>
+              <a:rPr lang="fr-FR" sz="1300" u="sng" dirty="0"/>
+              <a:t>Point d’entrée :</a:t>
+            </a:r>
+          </a:p>
+          <a:p>
+            <a:r>
+              <a:rPr lang="fr-FR" sz="1300" dirty="0"/>
+              <a:t>Le point d’entrée est le 1</a:t>
+            </a:r>
+            <a:r>
+              <a:rPr lang="fr-FR" sz="1300" baseline="30000" dirty="0"/>
+              <a:t>er</a:t>
+            </a:r>
+            <a:r>
+              <a:rPr lang="fr-FR" sz="1300" dirty="0"/>
+              <a:t> code exécuté au démarrage </a:t>
+            </a:r>
+            <a:r>
+              <a:rPr lang="fr-FR" sz="1300"/>
+              <a:t>du programme</a:t>
+            </a:r>
+            <a:endParaRPr lang="fr-FR" sz="1300" dirty="0"/>
+          </a:p>
+          <a:p>
+            <a:r>
+              <a:rPr lang="fr-FR" sz="1300" dirty="0"/>
+              <a:t>Il contient un certain nombre d’option de ligne de commande pour pouvoir changer de configuration dans devoir recompiler</a:t>
+            </a:r>
+          </a:p>
+          <a:p>
+            <a:pPr marL="0" indent="0">
+              <a:buNone/>
+            </a:pPr>
+            <a:endParaRPr lang="fr-FR" sz="1300" dirty="0"/>
           </a:p>
         </p:txBody>
       </p:sp>
@@ -17975,10 +17907,40 @@
           </a:p>
         </p:txBody>
       </p:sp>
+      <p:pic>
+        <p:nvPicPr>
+          <p:cNvPr id="7" name="Image 6">
+            <a:extLst>
+              <a:ext uri="{FF2B5EF4-FFF2-40B4-BE49-F238E27FC236}">
+                <a16:creationId xmlns:a16="http://schemas.microsoft.com/office/drawing/2014/main" id="{1529DE19-AFCE-4976-B964-DC763D49D943}"/>
+              </a:ext>
+            </a:extLst>
+          </p:cNvPr>
+          <p:cNvPicPr>
+            <a:picLocks noChangeAspect="1"/>
+          </p:cNvPicPr>
+          <p:nvPr/>
+        </p:nvPicPr>
+        <p:blipFill>
+          <a:blip r:embed="rId2"/>
+          <a:stretch>
+            <a:fillRect/>
+          </a:stretch>
+        </p:blipFill>
+        <p:spPr>
+          <a:xfrm>
+            <a:off x="1536784" y="2513566"/>
+            <a:ext cx="6796845" cy="3828992"/>
+          </a:xfrm>
+          <a:prstGeom prst="rect">
+            <a:avLst/>
+          </a:prstGeom>
+        </p:spPr>
+      </p:pic>
     </p:spTree>
     <p:extLst>
       <p:ext uri="{BB962C8B-B14F-4D97-AF65-F5344CB8AC3E}">
-        <p14:creationId xmlns:p14="http://schemas.microsoft.com/office/powerpoint/2010/main" val="246538531"/>
+        <p14:creationId xmlns:p14="http://schemas.microsoft.com/office/powerpoint/2010/main" val="624325067"/>
       </p:ext>
     </p:extLst>
   </p:cSld>
@@ -18010,7 +17972,7 @@
           <p:cNvPr id="2" name="Titre 1">
             <a:extLst>
               <a:ext uri="{FF2B5EF4-FFF2-40B4-BE49-F238E27FC236}">
-                <a16:creationId xmlns:a16="http://schemas.microsoft.com/office/drawing/2014/main" id="{AC243CA6-3E7C-430A-930C-EAE90E84A641}"/>
+                <a16:creationId xmlns:a16="http://schemas.microsoft.com/office/drawing/2014/main" id="{EA53D9FC-3044-40B7-A8EB-EAB80F26D6FE}"/>
               </a:ext>
             </a:extLst>
           </p:cNvPr>
@@ -18024,18 +17986,18 @@
         <p:spPr>
           <a:xfrm>
             <a:off x="1066800" y="642594"/>
-            <a:ext cx="10058400" cy="627082"/>
+            <a:ext cx="10645674" cy="556814"/>
           </a:xfrm>
         </p:spPr>
         <p:txBody>
           <a:bodyPr>
-            <a:normAutofit/>
+            <a:normAutofit fontScale="90000"/>
           </a:bodyPr>
           <a:lstStyle/>
           <a:p>
             <a:r>
               <a:rPr lang="fr-FR" sz="2000" dirty="0"/>
-              <a:t>3.1) Linux : Installation du serveur en tant que service</a:t>
+              <a:t>3.1) Linux : Mettre au point du module du capteur et Tester le serveur en interne et externe</a:t>
             </a:r>
           </a:p>
         </p:txBody>
@@ -18045,7 +18007,7 @@
           <p:cNvPr id="3" name="Espace réservé du contenu 2">
             <a:extLst>
               <a:ext uri="{FF2B5EF4-FFF2-40B4-BE49-F238E27FC236}">
-                <a16:creationId xmlns:a16="http://schemas.microsoft.com/office/drawing/2014/main" id="{F9FF48D2-6ACC-4A0B-8D01-3187A073C1EB}"/>
+                <a16:creationId xmlns:a16="http://schemas.microsoft.com/office/drawing/2014/main" id="{5837093E-200E-45C2-A38D-202DB399C72A}"/>
               </a:ext>
             </a:extLst>
           </p:cNvPr>
@@ -18058,75 +18020,137 @@
         </p:nvSpPr>
         <p:spPr>
           <a:xfrm>
-            <a:off x="1066800" y="1269676"/>
-            <a:ext cx="10058400" cy="4683068"/>
-          </a:xfrm>
-        </p:spPr>
-        <p:txBody>
-          <a:bodyPr/>
-          <a:lstStyle/>
-          <a:p>
-            <a:r>
-              <a:rPr lang="fr-FR" dirty="0"/>
-              <a:t>Ecriture du fichier BME280Server.service pour l’ordonnanceur de tache </a:t>
-            </a:r>
-            <a:r>
-              <a:rPr lang="fr-FR" dirty="0" err="1"/>
-              <a:t>SystemD</a:t>
-            </a:r>
-            <a:endParaRPr lang="fr-FR" dirty="0"/>
-          </a:p>
-          <a:p>
-            <a:r>
-              <a:rPr lang="fr-FR" dirty="0"/>
-              <a:t>Si le serveur crash, il sera redémarré automatiquement</a:t>
-            </a:r>
-          </a:p>
-          <a:p>
-            <a:r>
-              <a:rPr lang="fr-FR" dirty="0"/>
-              <a:t>Si l’os redémarre, le serveur démarrera automatiquement au démarrage</a:t>
-            </a:r>
-          </a:p>
-          <a:p>
-            <a:r>
-              <a:rPr lang="fr-FR" dirty="0"/>
-              <a:t>Démarrage du service</a:t>
-            </a:r>
-          </a:p>
-          <a:p>
-            <a:r>
-              <a:rPr lang="fr-FR" dirty="0"/>
-              <a:t>Vérification que le service est bien démarré et écoute sur le port HTTP</a:t>
-            </a:r>
-          </a:p>
-          <a:p>
-            <a:r>
-              <a:rPr lang="fr-FR" dirty="0"/>
-              <a:t>Inspection des journaux de log avec la commande </a:t>
-            </a:r>
-            <a:r>
-              <a:rPr lang="fr-FR" dirty="0" err="1"/>
-              <a:t>journalctl</a:t>
-            </a:r>
-            <a:r>
-              <a:rPr lang="fr-FR" dirty="0"/>
-              <a:t> qui permet de consulter les journaux générer pas les service </a:t>
-            </a:r>
-            <a:r>
-              <a:rPr lang="fr-FR" dirty="0" err="1"/>
-              <a:t>systemD</a:t>
-            </a:r>
-            <a:r>
-              <a:rPr lang="fr-FR" dirty="0"/>
-              <a:t>, pour vérifier qu’il n’y a pas eu d’erreurs au démarrage</a:t>
-            </a:r>
-          </a:p>
-          <a:p>
-            <a:endParaRPr lang="fr-FR" dirty="0"/>
-          </a:p>
-          <a:p>
-            <a:endParaRPr lang="fr-FR" dirty="0"/>
+            <a:off x="1066800" y="1300348"/>
+            <a:ext cx="10529190" cy="5042210"/>
+          </a:xfrm>
+        </p:spPr>
+        <p:txBody>
+          <a:bodyPr>
+            <a:normAutofit/>
+          </a:bodyPr>
+          <a:lstStyle/>
+          <a:p>
+            <a:r>
+              <a:rPr lang="fr-FR" sz="1200" dirty="0"/>
+              <a:t>Connection en SSH sur le Raspberry PI</a:t>
+            </a:r>
+          </a:p>
+          <a:p>
+            <a:r>
+              <a:rPr lang="fr-FR" sz="1200" dirty="0"/>
+              <a:t>Vérifier que les outils de </a:t>
+            </a:r>
+            <a:r>
+              <a:rPr lang="fr-FR" sz="1200" dirty="0" err="1"/>
+              <a:t>Build</a:t>
+            </a:r>
+            <a:r>
+              <a:rPr lang="fr-FR" sz="1200" dirty="0"/>
+              <a:t> sont installée et que le module I2C est chargé et démarre bien automatiquement avec le Raspberry pi </a:t>
+            </a:r>
+          </a:p>
+          <a:p>
+            <a:r>
+              <a:rPr lang="fr-FR" sz="1200" dirty="0"/>
+              <a:t>Module BME280 :</a:t>
+            </a:r>
+          </a:p>
+          <a:p>
+            <a:pPr lvl="1"/>
+            <a:r>
+              <a:rPr lang="fr-FR" sz="1200" dirty="0"/>
+              <a:t>Vérification que la mesure ce fait et que le retour est conforme au script python fourni par AJC en référence</a:t>
+            </a:r>
+          </a:p>
+          <a:p>
+            <a:pPr lvl="1"/>
+            <a:r>
+              <a:rPr lang="fr-FR" sz="1200" dirty="0"/>
+              <a:t>Vérification que le format JSON est correct</a:t>
+            </a:r>
+          </a:p>
+          <a:p>
+            <a:pPr lvl="1"/>
+            <a:endParaRPr lang="fr-FR" sz="1200" dirty="0"/>
+          </a:p>
+          <a:p>
+            <a:r>
+              <a:rPr lang="fr-FR" sz="1400" dirty="0"/>
+              <a:t>Vérification que le programme fonctionne correctement :</a:t>
+            </a:r>
+          </a:p>
+          <a:p>
+            <a:pPr lvl="1"/>
+            <a:r>
+              <a:rPr lang="fr-FR" sz="1200" dirty="0"/>
+              <a:t>Démarrage de l’écoute du port 80 et test avec un navigateur sur IP localhost (127.0.0.1)</a:t>
+            </a:r>
+          </a:p>
+          <a:p>
+            <a:pPr lvl="2"/>
+            <a:r>
+              <a:rPr lang="fr-FR" dirty="0"/>
+              <a:t>Le port HTTP par default a savoir le 80 étant un port protégé ( ports de 0 à 1024), </a:t>
+            </a:r>
+          </a:p>
+          <a:p>
+            <a:pPr marL="822960" lvl="3" indent="0">
+              <a:buNone/>
+            </a:pPr>
+            <a:r>
+              <a:rPr lang="fr-FR" sz="1200" dirty="0"/>
+              <a:t>	   il faut démarrer le serveur avec les privilèges </a:t>
+            </a:r>
+            <a:r>
+              <a:rPr lang="fr-FR" dirty="0"/>
+              <a:t>Administrateur</a:t>
+            </a:r>
+            <a:r>
+              <a:rPr lang="fr-FR" sz="1200" dirty="0"/>
+              <a:t>.</a:t>
+            </a:r>
+          </a:p>
+          <a:p>
+            <a:pPr lvl="2"/>
+            <a:r>
+              <a:rPr lang="fr-FR" sz="1100" dirty="0"/>
+              <a:t>Connection a l’url </a:t>
+            </a:r>
+            <a:r>
+              <a:rPr lang="fr-FR" sz="1100" dirty="0">
+                <a:hlinkClick r:id="rId2"/>
+              </a:rPr>
+              <a:t>http://78.199.78.207:48001</a:t>
+            </a:r>
+            <a:endParaRPr lang="fr-FR" sz="1100" dirty="0"/>
+          </a:p>
+          <a:p>
+            <a:pPr lvl="2"/>
+            <a:r>
+              <a:rPr lang="fr-FR" sz="1100" dirty="0"/>
+              <a:t>Vérification que les différente url renvoient bien le bon contenu</a:t>
+            </a:r>
+          </a:p>
+          <a:p>
+            <a:pPr lvl="1"/>
+            <a:r>
+              <a:rPr lang="fr-FR" sz="1200" dirty="0"/>
+              <a:t>Validation de la partie base de donnée :</a:t>
+            </a:r>
+          </a:p>
+          <a:p>
+            <a:pPr lvl="2"/>
+            <a:r>
+              <a:rPr lang="fr-FR" sz="1100" dirty="0"/>
+              <a:t>Vérification que le fichier de BD est bien créé au bon endroit</a:t>
+            </a:r>
+          </a:p>
+          <a:p>
+            <a:pPr lvl="1"/>
+            <a:r>
+              <a:rPr lang="fr-FR" sz="1200" dirty="0"/>
+              <a:t>Test des différentes options du serveur en ligne de commandes</a:t>
+            </a:r>
           </a:p>
         </p:txBody>
       </p:sp>
@@ -18135,7 +18159,7 @@
           <p:cNvPr id="4" name="Espace réservé de la date 3">
             <a:extLst>
               <a:ext uri="{FF2B5EF4-FFF2-40B4-BE49-F238E27FC236}">
-                <a16:creationId xmlns:a16="http://schemas.microsoft.com/office/drawing/2014/main" id="{A63239B3-03E2-4871-83D9-61381DBCC3A4}"/>
+                <a16:creationId xmlns:a16="http://schemas.microsoft.com/office/drawing/2014/main" id="{60BDC591-8D09-4D49-88A2-408CD1604F69}"/>
               </a:ext>
             </a:extLst>
           </p:cNvPr>
@@ -18163,7 +18187,7 @@
     </p:spTree>
     <p:extLst>
       <p:ext uri="{BB962C8B-B14F-4D97-AF65-F5344CB8AC3E}">
-        <p14:creationId xmlns:p14="http://schemas.microsoft.com/office/powerpoint/2010/main" val="869506070"/>
+        <p14:creationId xmlns:p14="http://schemas.microsoft.com/office/powerpoint/2010/main" val="246538531"/>
       </p:ext>
     </p:extLst>
   </p:cSld>
@@ -18220,19 +18244,98 @@
           <a:p>
             <a:r>
               <a:rPr lang="fr-FR" sz="2000" dirty="0"/>
-              <a:t>4.1</a:t>
-            </a:r>
-            <a:r>
-              <a:rPr lang="fr-FR" sz="2200" dirty="0"/>
-              <a:t>) Résultat de la requête « page d’aide » : </a:t>
-            </a:r>
-            <a:r>
-              <a:rPr lang="fr-FR" sz="2200" dirty="0">
-                <a:hlinkClick r:id="rId2"/>
-              </a:rPr>
-              <a:t>http://78.199.78.207:48001</a:t>
-            </a:r>
-            <a:endParaRPr lang="fr-FR" sz="2000" dirty="0"/>
+              <a:t>3.1) Linux : Installation du serveur en tant que service</a:t>
+            </a:r>
+          </a:p>
+        </p:txBody>
+      </p:sp>
+      <p:sp>
+        <p:nvSpPr>
+          <p:cNvPr id="3" name="Espace réservé du contenu 2">
+            <a:extLst>
+              <a:ext uri="{FF2B5EF4-FFF2-40B4-BE49-F238E27FC236}">
+                <a16:creationId xmlns:a16="http://schemas.microsoft.com/office/drawing/2014/main" id="{F9FF48D2-6ACC-4A0B-8D01-3187A073C1EB}"/>
+              </a:ext>
+            </a:extLst>
+          </p:cNvPr>
+          <p:cNvSpPr>
+            <a:spLocks noGrp="1"/>
+          </p:cNvSpPr>
+          <p:nvPr>
+            <p:ph idx="1"/>
+          </p:nvPr>
+        </p:nvSpPr>
+        <p:spPr>
+          <a:xfrm>
+            <a:off x="1066800" y="1269676"/>
+            <a:ext cx="10058400" cy="4683068"/>
+          </a:xfrm>
+        </p:spPr>
+        <p:txBody>
+          <a:bodyPr/>
+          <a:lstStyle/>
+          <a:p>
+            <a:r>
+              <a:rPr lang="fr-FR" dirty="0"/>
+              <a:t>Ecriture du fichier BME280Server.service pour l’ordonnanceur de tache </a:t>
+            </a:r>
+            <a:r>
+              <a:rPr lang="fr-FR" dirty="0" err="1"/>
+              <a:t>SystemD</a:t>
+            </a:r>
+            <a:endParaRPr lang="fr-FR" dirty="0"/>
+          </a:p>
+          <a:p>
+            <a:r>
+              <a:rPr lang="fr-FR" dirty="0"/>
+              <a:t>Si le serveur crash, il sera redémarré automatiquement</a:t>
+            </a:r>
+          </a:p>
+          <a:p>
+            <a:r>
+              <a:rPr lang="fr-FR" dirty="0"/>
+              <a:t>Si l’os redémarre, le serveur démarrera automatiquement au démarrage</a:t>
+            </a:r>
+          </a:p>
+          <a:p>
+            <a:r>
+              <a:rPr lang="fr-FR" dirty="0"/>
+              <a:t>Démarrage du service</a:t>
+            </a:r>
+          </a:p>
+          <a:p>
+            <a:r>
+              <a:rPr lang="fr-FR" dirty="0"/>
+              <a:t>Vérification que le service est bien démarré et écoute sur le port HTTP</a:t>
+            </a:r>
+          </a:p>
+          <a:p>
+            <a:r>
+              <a:rPr lang="fr-FR" dirty="0"/>
+              <a:t>Inspection des journaux de log avec la commande </a:t>
+            </a:r>
+            <a:r>
+              <a:rPr lang="fr-FR" dirty="0" err="1"/>
+              <a:t>journalctl</a:t>
+            </a:r>
+            <a:r>
+              <a:rPr lang="fr-FR" dirty="0"/>
+              <a:t> qui permet de consulter les journaux générer pas les service </a:t>
+            </a:r>
+            <a:r>
+              <a:rPr lang="fr-FR" dirty="0" err="1"/>
+              <a:t>systemD</a:t>
+            </a:r>
+            <a:r>
+              <a:rPr lang="fr-FR" dirty="0"/>
+              <a:t>, pour vérifier qu’il n’y a pas eu d’erreurs au démarrage</a:t>
+            </a:r>
+          </a:p>
+          <a:p>
+            <a:endParaRPr lang="fr-FR" dirty="0"/>
+          </a:p>
+          <a:p>
+            <a:endParaRPr lang="fr-FR" dirty="0"/>
           </a:p>
         </p:txBody>
       </p:sp>
@@ -18266,122 +18369,10 @@
           </a:p>
         </p:txBody>
       </p:sp>
-      <p:pic>
-        <p:nvPicPr>
-          <p:cNvPr id="10" name="Image 9">
-            <a:extLst>
-              <a:ext uri="{FF2B5EF4-FFF2-40B4-BE49-F238E27FC236}">
-                <a16:creationId xmlns:a16="http://schemas.microsoft.com/office/drawing/2014/main" id="{B8EE5EE3-6407-4D45-9F50-DA074893C793}"/>
-              </a:ext>
-            </a:extLst>
-          </p:cNvPr>
-          <p:cNvPicPr>
-            <a:picLocks noChangeAspect="1"/>
-          </p:cNvPicPr>
-          <p:nvPr/>
-        </p:nvPicPr>
-        <p:blipFill>
-          <a:blip r:embed="rId3"/>
-          <a:stretch>
-            <a:fillRect/>
-          </a:stretch>
-        </p:blipFill>
-        <p:spPr>
-          <a:xfrm>
-            <a:off x="1632538" y="1269676"/>
-            <a:ext cx="2893471" cy="4901068"/>
-          </a:xfrm>
-          <a:prstGeom prst="rect">
-            <a:avLst/>
-          </a:prstGeom>
-        </p:spPr>
-      </p:pic>
-      <p:sp>
-        <p:nvSpPr>
-          <p:cNvPr id="11" name="ZoneTexte 10">
-            <a:extLst>
-              <a:ext uri="{FF2B5EF4-FFF2-40B4-BE49-F238E27FC236}">
-                <a16:creationId xmlns:a16="http://schemas.microsoft.com/office/drawing/2014/main" id="{50D44826-D9D7-4D83-8555-EAA0708A669C}"/>
-              </a:ext>
-            </a:extLst>
-          </p:cNvPr>
-          <p:cNvSpPr txBox="1"/>
-          <p:nvPr/>
-        </p:nvSpPr>
-        <p:spPr>
-          <a:xfrm>
-            <a:off x="4857135" y="1315557"/>
-            <a:ext cx="6550191" cy="2308324"/>
-          </a:xfrm>
-          <a:prstGeom prst="rect">
-            <a:avLst/>
-          </a:prstGeom>
-          <a:noFill/>
-        </p:spPr>
-        <p:txBody>
-          <a:bodyPr wrap="none" rtlCol="0">
-            <a:spAutoFit/>
-          </a:bodyPr>
-          <a:lstStyle/>
-          <a:p>
-            <a:r>
-              <a:rPr lang="fr-FR" dirty="0"/>
-              <a:t>Si l’utilisateur ne connait pas les possibilité du serveur,</a:t>
-            </a:r>
-          </a:p>
-          <a:p>
-            <a:r>
-              <a:rPr lang="fr-FR" dirty="0"/>
-              <a:t>La connexion sur </a:t>
-            </a:r>
-            <a:r>
-              <a:rPr lang="fr-FR" dirty="0" err="1"/>
-              <a:t>l’ip</a:t>
-            </a:r>
-            <a:r>
-              <a:rPr lang="fr-FR" dirty="0"/>
-              <a:t> du serveur donne une page d’aide </a:t>
-            </a:r>
-          </a:p>
-          <a:p>
-            <a:r>
-              <a:rPr lang="fr-FR" dirty="0"/>
-              <a:t>Qui donne des explication sur le but du serveur </a:t>
-            </a:r>
-          </a:p>
-          <a:p>
-            <a:r>
-              <a:rPr lang="fr-FR" dirty="0"/>
-              <a:t>et les services disponible.</a:t>
-            </a:r>
-          </a:p>
-          <a:p>
-            <a:endParaRPr lang="fr-FR" dirty="0"/>
-          </a:p>
-          <a:p>
-            <a:r>
-              <a:rPr lang="fr-FR" dirty="0"/>
-              <a:t>Seulement écrit en anglais.</a:t>
-            </a:r>
-          </a:p>
-          <a:p>
-            <a:r>
-              <a:rPr lang="fr-FR" dirty="0"/>
-              <a:t>Une piste d’amélioration serait de pouvoir </a:t>
-            </a:r>
-          </a:p>
-          <a:p>
-            <a:r>
-              <a:rPr lang="fr-FR" dirty="0"/>
-              <a:t>proposer d’autres langue</a:t>
-            </a:r>
-          </a:p>
-        </p:txBody>
-      </p:sp>
     </p:spTree>
     <p:extLst>
       <p:ext uri="{BB962C8B-B14F-4D97-AF65-F5344CB8AC3E}">
-        <p14:creationId xmlns:p14="http://schemas.microsoft.com/office/powerpoint/2010/main" val="3657963763"/>
+        <p14:creationId xmlns:p14="http://schemas.microsoft.com/office/powerpoint/2010/main" val="869506070"/>
       </p:ext>
     </p:extLst>
   </p:cSld>
@@ -18442,13 +18433,13 @@
             </a:r>
             <a:r>
               <a:rPr lang="fr-FR" sz="2200" dirty="0"/>
-              <a:t>) Résultat de la requête « infos » : </a:t>
+              <a:t>) Résultat de la requête « page d’aide » : </a:t>
             </a:r>
             <a:r>
               <a:rPr lang="fr-FR" sz="2200" dirty="0">
                 <a:hlinkClick r:id="rId2"/>
               </a:rPr>
-              <a:t>http://78.199.78.207:48001/infos</a:t>
+              <a:t>http://78.199.78.207:48001</a:t>
             </a:r>
             <a:endParaRPr lang="fr-FR" sz="2000" dirty="0"/>
           </a:p>
@@ -18486,10 +18477,10 @@
       </p:sp>
       <p:pic>
         <p:nvPicPr>
-          <p:cNvPr id="5" name="Image 4">
-            <a:extLst>
-              <a:ext uri="{FF2B5EF4-FFF2-40B4-BE49-F238E27FC236}">
-                <a16:creationId xmlns:a16="http://schemas.microsoft.com/office/drawing/2014/main" id="{6BA78115-F0F1-4967-88AE-4B642F51CF29}"/>
+          <p:cNvPr id="10" name="Image 9">
+            <a:extLst>
+              <a:ext uri="{FF2B5EF4-FFF2-40B4-BE49-F238E27FC236}">
+                <a16:creationId xmlns:a16="http://schemas.microsoft.com/office/drawing/2014/main" id="{B8EE5EE3-6407-4D45-9F50-DA074893C793}"/>
               </a:ext>
             </a:extLst>
           </p:cNvPr>
@@ -18506,8 +18497,8 @@
         </p:blipFill>
         <p:spPr>
           <a:xfrm>
-            <a:off x="2279158" y="2023219"/>
-            <a:ext cx="6424158" cy="4011821"/>
+            <a:off x="1632538" y="1269676"/>
+            <a:ext cx="2893471" cy="4901068"/>
           </a:xfrm>
           <a:prstGeom prst="rect">
             <a:avLst/>
@@ -18516,10 +18507,10 @@
       </p:pic>
       <p:sp>
         <p:nvSpPr>
-          <p:cNvPr id="7" name="ZoneTexte 6">
-            <a:extLst>
-              <a:ext uri="{FF2B5EF4-FFF2-40B4-BE49-F238E27FC236}">
-                <a16:creationId xmlns:a16="http://schemas.microsoft.com/office/drawing/2014/main" id="{E07BF723-B5D5-4416-842C-66874E9E3EFB}"/>
+          <p:cNvPr id="11" name="ZoneTexte 10">
+            <a:extLst>
+              <a:ext uri="{FF2B5EF4-FFF2-40B4-BE49-F238E27FC236}">
+                <a16:creationId xmlns:a16="http://schemas.microsoft.com/office/drawing/2014/main" id="{50D44826-D9D7-4D83-8555-EAA0708A669C}"/>
               </a:ext>
             </a:extLst>
           </p:cNvPr>
@@ -18528,8 +18519,8 @@
         </p:nvSpPr>
         <p:spPr>
           <a:xfrm>
-            <a:off x="2096260" y="1461781"/>
-            <a:ext cx="6923690" cy="369332"/>
+            <a:off x="4857135" y="1315557"/>
+            <a:ext cx="5121915" cy="1815882"/>
           </a:xfrm>
           <a:prstGeom prst="rect">
             <a:avLst/>
@@ -18543,8 +18534,55 @@
           <a:lstStyle/>
           <a:p>
             <a:r>
-              <a:rPr lang="fr-FR" dirty="0"/>
-              <a:t>Récupération des information sur le serveur et le system hôte</a:t>
+              <a:rPr lang="fr-FR" sz="1400" dirty="0"/>
+              <a:t>Si l’utilisateur ne connait pas les possibilité du serveur,</a:t>
+            </a:r>
+          </a:p>
+          <a:p>
+            <a:r>
+              <a:rPr lang="fr-FR" sz="1400" dirty="0"/>
+              <a:t>La connexion sur </a:t>
+            </a:r>
+            <a:r>
+              <a:rPr lang="fr-FR" sz="1400" dirty="0" err="1"/>
+              <a:t>l’ip</a:t>
+            </a:r>
+            <a:r>
+              <a:rPr lang="fr-FR" sz="1400" dirty="0"/>
+              <a:t> du serveur donne une page d’aide </a:t>
+            </a:r>
+          </a:p>
+          <a:p>
+            <a:r>
+              <a:rPr lang="fr-FR" sz="1400" dirty="0"/>
+              <a:t>Qui donne des explications sur le but du serveur </a:t>
+            </a:r>
+          </a:p>
+          <a:p>
+            <a:r>
+              <a:rPr lang="fr-FR" sz="1400" dirty="0"/>
+              <a:t>et les services disponible.</a:t>
+            </a:r>
+          </a:p>
+          <a:p>
+            <a:endParaRPr lang="fr-FR" sz="1400" dirty="0"/>
+          </a:p>
+          <a:p>
+            <a:r>
+              <a:rPr lang="fr-FR" sz="1400" dirty="0"/>
+              <a:t>Seulement écrit en anglais.</a:t>
+            </a:r>
+          </a:p>
+          <a:p>
+            <a:r>
+              <a:rPr lang="fr-FR" sz="1400" dirty="0"/>
+              <a:t>Une piste d’amélioration serait de pouvoir </a:t>
+            </a:r>
+          </a:p>
+          <a:p>
+            <a:r>
+              <a:rPr lang="fr-FR" sz="1400" dirty="0"/>
+              <a:t>proposer d’autres langues</a:t>
             </a:r>
           </a:p>
         </p:txBody>
@@ -18552,7 +18590,7 @@
     </p:spTree>
     <p:extLst>
       <p:ext uri="{BB962C8B-B14F-4D97-AF65-F5344CB8AC3E}">
-        <p14:creationId xmlns:p14="http://schemas.microsoft.com/office/powerpoint/2010/main" val="3486339967"/>
+        <p14:creationId xmlns:p14="http://schemas.microsoft.com/office/powerpoint/2010/main" val="3657963763"/>
       </p:ext>
     </p:extLst>
   </p:cSld>
@@ -18613,13 +18651,13 @@
             </a:r>
             <a:r>
               <a:rPr lang="fr-FR" sz="2200" dirty="0"/>
-              <a:t>) Résultat de la requête « mesure » : </a:t>
+              <a:t>) Résultat de la requête « infos » : </a:t>
             </a:r>
             <a:r>
               <a:rPr lang="fr-FR" sz="2200" dirty="0">
                 <a:hlinkClick r:id="rId2"/>
               </a:rPr>
-              <a:t>http://78.199.78.207:48001/sensor</a:t>
+              <a:t>http://78.199.78.207:48001/infos</a:t>
             </a:r>
             <a:endParaRPr lang="fr-FR" sz="2000" dirty="0"/>
           </a:p>
@@ -18660,7 +18698,7 @@
           <p:cNvPr id="5" name="Image 4">
             <a:extLst>
               <a:ext uri="{FF2B5EF4-FFF2-40B4-BE49-F238E27FC236}">
-                <a16:creationId xmlns:a16="http://schemas.microsoft.com/office/drawing/2014/main" id="{B9D26BDE-5E08-4DF9-8CCE-1471B3BA54E4}"/>
+                <a16:creationId xmlns:a16="http://schemas.microsoft.com/office/drawing/2014/main" id="{6BA78115-F0F1-4967-88AE-4B642F51CF29}"/>
               </a:ext>
             </a:extLst>
           </p:cNvPr>
@@ -18677,8 +18715,8 @@
         </p:blipFill>
         <p:spPr>
           <a:xfrm>
-            <a:off x="2451037" y="2093892"/>
-            <a:ext cx="6252279" cy="3427454"/>
+            <a:off x="2279158" y="2023219"/>
+            <a:ext cx="6424158" cy="4011821"/>
           </a:xfrm>
           <a:prstGeom prst="rect">
             <a:avLst/>
@@ -18690,7 +18728,7 @@
           <p:cNvPr id="7" name="ZoneTexte 6">
             <a:extLst>
               <a:ext uri="{FF2B5EF4-FFF2-40B4-BE49-F238E27FC236}">
-                <a16:creationId xmlns:a16="http://schemas.microsoft.com/office/drawing/2014/main" id="{457DB84A-4E35-4102-A7CE-A21BA60816C4}"/>
+                <a16:creationId xmlns:a16="http://schemas.microsoft.com/office/drawing/2014/main" id="{E07BF723-B5D5-4416-842C-66874E9E3EFB}"/>
               </a:ext>
             </a:extLst>
           </p:cNvPr>
@@ -18699,8 +18737,8 @@
         </p:nvSpPr>
         <p:spPr>
           <a:xfrm>
-            <a:off x="2633101" y="1598704"/>
-            <a:ext cx="5888150" cy="369332"/>
+            <a:off x="2096260" y="1461781"/>
+            <a:ext cx="6923690" cy="369332"/>
           </a:xfrm>
           <a:prstGeom prst="rect">
             <a:avLst/>
@@ -18715,7 +18753,7 @@
           <a:p>
             <a:r>
               <a:rPr lang="fr-FR" dirty="0"/>
-              <a:t>Déclenchement d’une mesure du capteur BME280</a:t>
+              <a:t>Récupération des information sur le serveur et le system hôte</a:t>
             </a:r>
           </a:p>
         </p:txBody>
@@ -18723,7 +18761,7 @@
     </p:spTree>
     <p:extLst>
       <p:ext uri="{BB962C8B-B14F-4D97-AF65-F5344CB8AC3E}">
-        <p14:creationId xmlns:p14="http://schemas.microsoft.com/office/powerpoint/2010/main" val="3765237782"/>
+        <p14:creationId xmlns:p14="http://schemas.microsoft.com/office/powerpoint/2010/main" val="3486339967"/>
       </p:ext>
     </p:extLst>
   </p:cSld>
@@ -18774,7 +18812,7 @@
         </p:spPr>
         <p:txBody>
           <a:bodyPr>
-            <a:normAutofit fontScale="90000"/>
+            <a:normAutofit/>
           </a:bodyPr>
           <a:lstStyle/>
           <a:p>
@@ -18784,17 +18822,14 @@
             </a:r>
             <a:r>
               <a:rPr lang="fr-FR" sz="2200" dirty="0"/>
-              <a:t>) Résultat de la requête « historique des 12 dernières mesures » : 	</a:t>
+              <a:t>) Résultat de la requête « mesure » : </a:t>
             </a:r>
             <a:r>
               <a:rPr lang="fr-FR" sz="2200" dirty="0">
                 <a:hlinkClick r:id="rId2"/>
               </a:rPr>
-              <a:t>http://78.199.78.207:48001/history:12</a:t>
-            </a:r>
-            <a:br>
-              <a:rPr lang="fr-FR" sz="1800" dirty="0"/>
-            </a:br>
+              <a:t>http://78.199.78.207:48001/sensor</a:t>
+            </a:r>
             <a:endParaRPr lang="fr-FR" sz="2000" dirty="0"/>
           </a:p>
         </p:txBody>
@@ -18834,7 +18869,7 @@
           <p:cNvPr id="5" name="Image 4">
             <a:extLst>
               <a:ext uri="{FF2B5EF4-FFF2-40B4-BE49-F238E27FC236}">
-                <a16:creationId xmlns:a16="http://schemas.microsoft.com/office/drawing/2014/main" id="{451D6ED5-1EDF-4B47-8C7E-7EEA2A82185B}"/>
+                <a16:creationId xmlns:a16="http://schemas.microsoft.com/office/drawing/2014/main" id="{B9D26BDE-5E08-4DF9-8CCE-1471B3BA54E4}"/>
               </a:ext>
             </a:extLst>
           </p:cNvPr>
@@ -18851,80 +18886,20 @@
         </p:blipFill>
         <p:spPr>
           <a:xfrm>
-            <a:off x="666296" y="2210179"/>
-            <a:ext cx="2520857" cy="4184722"/>
+            <a:off x="2451037" y="2093892"/>
+            <a:ext cx="6252279" cy="3427454"/>
           </a:xfrm>
           <a:prstGeom prst="rect">
             <a:avLst/>
           </a:prstGeom>
         </p:spPr>
       </p:pic>
-      <p:pic>
-        <p:nvPicPr>
-          <p:cNvPr id="8" name="Image 7">
-            <a:extLst>
-              <a:ext uri="{FF2B5EF4-FFF2-40B4-BE49-F238E27FC236}">
-                <a16:creationId xmlns:a16="http://schemas.microsoft.com/office/drawing/2014/main" id="{9B0AAF31-6401-4DEC-B2EF-768C227F4197}"/>
-              </a:ext>
-            </a:extLst>
-          </p:cNvPr>
-          <p:cNvPicPr>
-            <a:picLocks noChangeAspect="1"/>
-          </p:cNvPicPr>
-          <p:nvPr/>
-        </p:nvPicPr>
-        <p:blipFill>
-          <a:blip r:embed="rId4"/>
-          <a:stretch>
-            <a:fillRect/>
-          </a:stretch>
-        </p:blipFill>
-        <p:spPr>
-          <a:xfrm>
-            <a:off x="8170606" y="2642238"/>
-            <a:ext cx="3063437" cy="3709055"/>
-          </a:xfrm>
-          <a:prstGeom prst="rect">
-            <a:avLst/>
-          </a:prstGeom>
-        </p:spPr>
-      </p:pic>
-      <p:pic>
-        <p:nvPicPr>
-          <p:cNvPr id="10" name="Image 9">
-            <a:extLst>
-              <a:ext uri="{FF2B5EF4-FFF2-40B4-BE49-F238E27FC236}">
-                <a16:creationId xmlns:a16="http://schemas.microsoft.com/office/drawing/2014/main" id="{BCF7F367-011D-4785-AD3B-E5846130A12D}"/>
-              </a:ext>
-            </a:extLst>
-          </p:cNvPr>
-          <p:cNvPicPr>
-            <a:picLocks noChangeAspect="1"/>
-          </p:cNvPicPr>
-          <p:nvPr/>
-        </p:nvPicPr>
-        <p:blipFill>
-          <a:blip r:embed="rId5"/>
-          <a:stretch>
-            <a:fillRect/>
-          </a:stretch>
-        </p:blipFill>
-        <p:spPr>
-          <a:xfrm>
-            <a:off x="3474128" y="2611335"/>
-            <a:ext cx="3864553" cy="2437641"/>
-          </a:xfrm>
-          <a:prstGeom prst="rect">
-            <a:avLst/>
-          </a:prstGeom>
-        </p:spPr>
-      </p:pic>
-      <p:sp>
-        <p:nvSpPr>
-          <p:cNvPr id="11" name="ZoneTexte 10">
-            <a:extLst>
-              <a:ext uri="{FF2B5EF4-FFF2-40B4-BE49-F238E27FC236}">
-                <a16:creationId xmlns:a16="http://schemas.microsoft.com/office/drawing/2014/main" id="{63C1B8A5-25F8-4D33-BB55-B947DF42B0D1}"/>
+      <p:sp>
+        <p:nvSpPr>
+          <p:cNvPr id="7" name="ZoneTexte 6">
+            <a:extLst>
+              <a:ext uri="{FF2B5EF4-FFF2-40B4-BE49-F238E27FC236}">
+                <a16:creationId xmlns:a16="http://schemas.microsoft.com/office/drawing/2014/main" id="{457DB84A-4E35-4102-A7CE-A21BA60816C4}"/>
               </a:ext>
             </a:extLst>
           </p:cNvPr>
@@ -18933,8 +18908,8 @@
         </p:nvSpPr>
         <p:spPr>
           <a:xfrm>
-            <a:off x="922179" y="1809900"/>
-            <a:ext cx="2015295" cy="369332"/>
+            <a:off x="2633101" y="1598704"/>
+            <a:ext cx="5888150" cy="369332"/>
           </a:xfrm>
           <a:prstGeom prst="rect">
             <a:avLst/>
@@ -18949,124 +18924,7 @@
           <a:p>
             <a:r>
               <a:rPr lang="fr-FR" dirty="0"/>
-              <a:t>Avec 12 valeurs </a:t>
-            </a:r>
-          </a:p>
-        </p:txBody>
-      </p:sp>
-      <p:sp>
-        <p:nvSpPr>
-          <p:cNvPr id="12" name="ZoneTexte 11">
-            <a:extLst>
-              <a:ext uri="{FF2B5EF4-FFF2-40B4-BE49-F238E27FC236}">
-                <a16:creationId xmlns:a16="http://schemas.microsoft.com/office/drawing/2014/main" id="{716299F9-494B-4C9A-A310-36860F8CAFF4}"/>
-              </a:ext>
-            </a:extLst>
-          </p:cNvPr>
-          <p:cNvSpPr txBox="1"/>
-          <p:nvPr/>
-        </p:nvSpPr>
-        <p:spPr>
-          <a:xfrm>
-            <a:off x="4298570" y="1856066"/>
-            <a:ext cx="2215671" cy="646331"/>
-          </a:xfrm>
-          <a:prstGeom prst="rect">
-            <a:avLst/>
-          </a:prstGeom>
-          <a:noFill/>
-        </p:spPr>
-        <p:txBody>
-          <a:bodyPr wrap="none" rtlCol="0">
-            <a:spAutoFit/>
-          </a:bodyPr>
-          <a:lstStyle/>
-          <a:p>
-            <a:r>
-              <a:rPr lang="fr-FR" dirty="0"/>
-              <a:t>Avec 12 valeurs </a:t>
-            </a:r>
-          </a:p>
-          <a:p>
-            <a:r>
-              <a:rPr lang="fr-FR" dirty="0"/>
-              <a:t>en affichage brut </a:t>
-            </a:r>
-          </a:p>
-        </p:txBody>
-      </p:sp>
-      <p:sp>
-        <p:nvSpPr>
-          <p:cNvPr id="14" name="ZoneTexte 13">
-            <a:extLst>
-              <a:ext uri="{FF2B5EF4-FFF2-40B4-BE49-F238E27FC236}">
-                <a16:creationId xmlns:a16="http://schemas.microsoft.com/office/drawing/2014/main" id="{64B01816-49C3-4FEF-8E9D-26DC2108588F}"/>
-              </a:ext>
-            </a:extLst>
-          </p:cNvPr>
-          <p:cNvSpPr txBox="1"/>
-          <p:nvPr/>
-        </p:nvSpPr>
-        <p:spPr>
-          <a:xfrm>
-            <a:off x="8478190" y="1887013"/>
-            <a:ext cx="6095028" cy="646331"/>
-          </a:xfrm>
-          <a:prstGeom prst="rect">
-            <a:avLst/>
-          </a:prstGeom>
-          <a:noFill/>
-        </p:spPr>
-        <p:txBody>
-          <a:bodyPr wrap="square">
-            <a:spAutoFit/>
-          </a:bodyPr>
-          <a:lstStyle/>
-          <a:p>
-            <a:r>
-              <a:rPr lang="fr-FR" dirty="0"/>
-              <a:t>Avec 30 valeurs </a:t>
-            </a:r>
-          </a:p>
-          <a:p>
-            <a:r>
-              <a:rPr lang="fr-FR" dirty="0"/>
-              <a:t>en affichage brut </a:t>
-            </a:r>
-          </a:p>
-        </p:txBody>
-      </p:sp>
-      <p:sp>
-        <p:nvSpPr>
-          <p:cNvPr id="15" name="ZoneTexte 14">
-            <a:extLst>
-              <a:ext uri="{FF2B5EF4-FFF2-40B4-BE49-F238E27FC236}">
-                <a16:creationId xmlns:a16="http://schemas.microsoft.com/office/drawing/2014/main" id="{656944A9-8AB8-44A4-8CC0-C405ACBE94C4}"/>
-              </a:ext>
-            </a:extLst>
-          </p:cNvPr>
-          <p:cNvSpPr txBox="1"/>
-          <p:nvPr/>
-        </p:nvSpPr>
-        <p:spPr>
-          <a:xfrm>
-            <a:off x="1770136" y="1258888"/>
-            <a:ext cx="8651727" cy="369332"/>
-          </a:xfrm>
-          <a:prstGeom prst="rect">
-            <a:avLst/>
-          </a:prstGeom>
-          <a:noFill/>
-        </p:spPr>
-        <p:txBody>
-          <a:bodyPr wrap="none" rtlCol="0">
-            <a:spAutoFit/>
-          </a:bodyPr>
-          <a:lstStyle/>
-          <a:p>
-            <a:r>
-              <a:rPr lang="fr-FR" dirty="0"/>
-              <a:t>Récupération de l’historique des X dernières mesures faites toutes les heures</a:t>
+              <a:t>Déclenchement d’une mesure du capteur BME280</a:t>
             </a:r>
           </a:p>
         </p:txBody>
@@ -19074,7 +18932,7 @@
     </p:spTree>
     <p:extLst>
       <p:ext uri="{BB962C8B-B14F-4D97-AF65-F5344CB8AC3E}">
-        <p14:creationId xmlns:p14="http://schemas.microsoft.com/office/powerpoint/2010/main" val="3950508307"/>
+        <p14:creationId xmlns:p14="http://schemas.microsoft.com/office/powerpoint/2010/main" val="3765237782"/>
       </p:ext>
     </p:extLst>
   </p:cSld>
@@ -19106,7 +18964,7 @@
           <p:cNvPr id="2" name="Titre 1">
             <a:extLst>
               <a:ext uri="{FF2B5EF4-FFF2-40B4-BE49-F238E27FC236}">
-                <a16:creationId xmlns:a16="http://schemas.microsoft.com/office/drawing/2014/main" id="{EA53D9FC-3044-40B7-A8EB-EAB80F26D6FE}"/>
+                <a16:creationId xmlns:a16="http://schemas.microsoft.com/office/drawing/2014/main" id="{AC243CA6-3E7C-430A-930C-EAE90E84A641}"/>
               </a:ext>
             </a:extLst>
           </p:cNvPr>
@@ -19117,50 +18975,36 @@
             <p:ph type="title"/>
           </p:nvPr>
         </p:nvSpPr>
-        <p:spPr/>
+        <p:spPr>
+          <a:xfrm>
+            <a:off x="1066800" y="642594"/>
+            <a:ext cx="10058400" cy="627082"/>
+          </a:xfrm>
+        </p:spPr>
         <p:txBody>
           <a:bodyPr>
-            <a:normAutofit/>
+            <a:normAutofit fontScale="90000"/>
           </a:bodyPr>
           <a:lstStyle/>
           <a:p>
             <a:r>
-              <a:rPr lang="fr-FR" dirty="0"/>
-              <a:t>Conception </a:t>
-            </a:r>
-            <a:r>
-              <a:rPr lang="fr-FR" dirty="0" err="1"/>
-              <a:t>dU</a:t>
-            </a:r>
-            <a:r>
-              <a:rPr lang="fr-FR" dirty="0"/>
-              <a:t> Client</a:t>
-            </a:r>
-          </a:p>
-        </p:txBody>
-      </p:sp>
-      <p:sp>
-        <p:nvSpPr>
-          <p:cNvPr id="7" name="Espace réservé du texte 6">
-            <a:extLst>
-              <a:ext uri="{FF2B5EF4-FFF2-40B4-BE49-F238E27FC236}">
-                <a16:creationId xmlns:a16="http://schemas.microsoft.com/office/drawing/2014/main" id="{20C697DF-1E44-4814-A10D-46B212D46301}"/>
-              </a:ext>
-            </a:extLst>
-          </p:cNvPr>
-          <p:cNvSpPr>
-            <a:spLocks noGrp="1"/>
-          </p:cNvSpPr>
-          <p:nvPr>
-            <p:ph type="body" idx="1"/>
-          </p:nvPr>
-        </p:nvSpPr>
-        <p:spPr/>
-        <p:txBody>
-          <a:bodyPr/>
-          <a:lstStyle/>
-          <a:p>
-            <a:endParaRPr lang="fr-FR" dirty="0"/>
+              <a:rPr lang="fr-FR" sz="2000" dirty="0"/>
+              <a:t>4.1</a:t>
+            </a:r>
+            <a:r>
+              <a:rPr lang="fr-FR" sz="2200" dirty="0"/>
+              <a:t>) Résultat de la requête « historique des 12 dernières mesures » : 	</a:t>
+            </a:r>
+            <a:r>
+              <a:rPr lang="fr-FR" sz="2200" dirty="0">
+                <a:hlinkClick r:id="rId2"/>
+              </a:rPr>
+              <a:t>http://78.199.78.207:48001/history:12</a:t>
+            </a:r>
+            <a:br>
+              <a:rPr lang="fr-FR" sz="1800" dirty="0"/>
+            </a:br>
+            <a:endParaRPr lang="fr-FR" sz="2000" dirty="0"/>
           </a:p>
         </p:txBody>
       </p:sp>
@@ -19169,7 +19013,7 @@
           <p:cNvPr id="4" name="Espace réservé de la date 3">
             <a:extLst>
               <a:ext uri="{FF2B5EF4-FFF2-40B4-BE49-F238E27FC236}">
-                <a16:creationId xmlns:a16="http://schemas.microsoft.com/office/drawing/2014/main" id="{60BDC591-8D09-4D49-88A2-408CD1604F69}"/>
+                <a16:creationId xmlns:a16="http://schemas.microsoft.com/office/drawing/2014/main" id="{A63239B3-03E2-4871-83D9-61381DBCC3A4}"/>
               </a:ext>
             </a:extLst>
           </p:cNvPr>
@@ -19194,10 +19038,252 @@
           </a:p>
         </p:txBody>
       </p:sp>
+      <p:pic>
+        <p:nvPicPr>
+          <p:cNvPr id="5" name="Image 4">
+            <a:extLst>
+              <a:ext uri="{FF2B5EF4-FFF2-40B4-BE49-F238E27FC236}">
+                <a16:creationId xmlns:a16="http://schemas.microsoft.com/office/drawing/2014/main" id="{451D6ED5-1EDF-4B47-8C7E-7EEA2A82185B}"/>
+              </a:ext>
+            </a:extLst>
+          </p:cNvPr>
+          <p:cNvPicPr>
+            <a:picLocks noChangeAspect="1"/>
+          </p:cNvPicPr>
+          <p:nvPr/>
+        </p:nvPicPr>
+        <p:blipFill>
+          <a:blip r:embed="rId3"/>
+          <a:stretch>
+            <a:fillRect/>
+          </a:stretch>
+        </p:blipFill>
+        <p:spPr>
+          <a:xfrm>
+            <a:off x="666296" y="2210179"/>
+            <a:ext cx="2520857" cy="4184722"/>
+          </a:xfrm>
+          <a:prstGeom prst="rect">
+            <a:avLst/>
+          </a:prstGeom>
+        </p:spPr>
+      </p:pic>
+      <p:pic>
+        <p:nvPicPr>
+          <p:cNvPr id="8" name="Image 7">
+            <a:extLst>
+              <a:ext uri="{FF2B5EF4-FFF2-40B4-BE49-F238E27FC236}">
+                <a16:creationId xmlns:a16="http://schemas.microsoft.com/office/drawing/2014/main" id="{9B0AAF31-6401-4DEC-B2EF-768C227F4197}"/>
+              </a:ext>
+            </a:extLst>
+          </p:cNvPr>
+          <p:cNvPicPr>
+            <a:picLocks noChangeAspect="1"/>
+          </p:cNvPicPr>
+          <p:nvPr/>
+        </p:nvPicPr>
+        <p:blipFill>
+          <a:blip r:embed="rId4"/>
+          <a:stretch>
+            <a:fillRect/>
+          </a:stretch>
+        </p:blipFill>
+        <p:spPr>
+          <a:xfrm>
+            <a:off x="8170606" y="2642238"/>
+            <a:ext cx="3063437" cy="3709055"/>
+          </a:xfrm>
+          <a:prstGeom prst="rect">
+            <a:avLst/>
+          </a:prstGeom>
+        </p:spPr>
+      </p:pic>
+      <p:pic>
+        <p:nvPicPr>
+          <p:cNvPr id="10" name="Image 9">
+            <a:extLst>
+              <a:ext uri="{FF2B5EF4-FFF2-40B4-BE49-F238E27FC236}">
+                <a16:creationId xmlns:a16="http://schemas.microsoft.com/office/drawing/2014/main" id="{BCF7F367-011D-4785-AD3B-E5846130A12D}"/>
+              </a:ext>
+            </a:extLst>
+          </p:cNvPr>
+          <p:cNvPicPr>
+            <a:picLocks noChangeAspect="1"/>
+          </p:cNvPicPr>
+          <p:nvPr/>
+        </p:nvPicPr>
+        <p:blipFill>
+          <a:blip r:embed="rId5"/>
+          <a:stretch>
+            <a:fillRect/>
+          </a:stretch>
+        </p:blipFill>
+        <p:spPr>
+          <a:xfrm>
+            <a:off x="3474128" y="2611335"/>
+            <a:ext cx="3864553" cy="2437641"/>
+          </a:xfrm>
+          <a:prstGeom prst="rect">
+            <a:avLst/>
+          </a:prstGeom>
+        </p:spPr>
+      </p:pic>
+      <p:sp>
+        <p:nvSpPr>
+          <p:cNvPr id="11" name="ZoneTexte 10">
+            <a:extLst>
+              <a:ext uri="{FF2B5EF4-FFF2-40B4-BE49-F238E27FC236}">
+                <a16:creationId xmlns:a16="http://schemas.microsoft.com/office/drawing/2014/main" id="{63C1B8A5-25F8-4D33-BB55-B947DF42B0D1}"/>
+              </a:ext>
+            </a:extLst>
+          </p:cNvPr>
+          <p:cNvSpPr txBox="1"/>
+          <p:nvPr/>
+        </p:nvSpPr>
+        <p:spPr>
+          <a:xfrm>
+            <a:off x="922179" y="1809900"/>
+            <a:ext cx="2015295" cy="369332"/>
+          </a:xfrm>
+          <a:prstGeom prst="rect">
+            <a:avLst/>
+          </a:prstGeom>
+          <a:noFill/>
+        </p:spPr>
+        <p:txBody>
+          <a:bodyPr wrap="none" rtlCol="0">
+            <a:spAutoFit/>
+          </a:bodyPr>
+          <a:lstStyle/>
+          <a:p>
+            <a:r>
+              <a:rPr lang="fr-FR" dirty="0"/>
+              <a:t>Avec 12 valeurs </a:t>
+            </a:r>
+          </a:p>
+        </p:txBody>
+      </p:sp>
+      <p:sp>
+        <p:nvSpPr>
+          <p:cNvPr id="12" name="ZoneTexte 11">
+            <a:extLst>
+              <a:ext uri="{FF2B5EF4-FFF2-40B4-BE49-F238E27FC236}">
+                <a16:creationId xmlns:a16="http://schemas.microsoft.com/office/drawing/2014/main" id="{716299F9-494B-4C9A-A310-36860F8CAFF4}"/>
+              </a:ext>
+            </a:extLst>
+          </p:cNvPr>
+          <p:cNvSpPr txBox="1"/>
+          <p:nvPr/>
+        </p:nvSpPr>
+        <p:spPr>
+          <a:xfrm>
+            <a:off x="4298570" y="1856066"/>
+            <a:ext cx="2215671" cy="646331"/>
+          </a:xfrm>
+          <a:prstGeom prst="rect">
+            <a:avLst/>
+          </a:prstGeom>
+          <a:noFill/>
+        </p:spPr>
+        <p:txBody>
+          <a:bodyPr wrap="none" rtlCol="0">
+            <a:spAutoFit/>
+          </a:bodyPr>
+          <a:lstStyle/>
+          <a:p>
+            <a:r>
+              <a:rPr lang="fr-FR" dirty="0"/>
+              <a:t>Avec 12 valeurs </a:t>
+            </a:r>
+          </a:p>
+          <a:p>
+            <a:r>
+              <a:rPr lang="fr-FR" dirty="0"/>
+              <a:t>en affichage brut </a:t>
+            </a:r>
+          </a:p>
+        </p:txBody>
+      </p:sp>
+      <p:sp>
+        <p:nvSpPr>
+          <p:cNvPr id="14" name="ZoneTexte 13">
+            <a:extLst>
+              <a:ext uri="{FF2B5EF4-FFF2-40B4-BE49-F238E27FC236}">
+                <a16:creationId xmlns:a16="http://schemas.microsoft.com/office/drawing/2014/main" id="{64B01816-49C3-4FEF-8E9D-26DC2108588F}"/>
+              </a:ext>
+            </a:extLst>
+          </p:cNvPr>
+          <p:cNvSpPr txBox="1"/>
+          <p:nvPr/>
+        </p:nvSpPr>
+        <p:spPr>
+          <a:xfrm>
+            <a:off x="8478190" y="1887013"/>
+            <a:ext cx="6095028" cy="646331"/>
+          </a:xfrm>
+          <a:prstGeom prst="rect">
+            <a:avLst/>
+          </a:prstGeom>
+          <a:noFill/>
+        </p:spPr>
+        <p:txBody>
+          <a:bodyPr wrap="square">
+            <a:spAutoFit/>
+          </a:bodyPr>
+          <a:lstStyle/>
+          <a:p>
+            <a:r>
+              <a:rPr lang="fr-FR" dirty="0"/>
+              <a:t>Avec 30 valeurs </a:t>
+            </a:r>
+          </a:p>
+          <a:p>
+            <a:r>
+              <a:rPr lang="fr-FR" dirty="0"/>
+              <a:t>en affichage brut </a:t>
+            </a:r>
+          </a:p>
+        </p:txBody>
+      </p:sp>
+      <p:sp>
+        <p:nvSpPr>
+          <p:cNvPr id="15" name="ZoneTexte 14">
+            <a:extLst>
+              <a:ext uri="{FF2B5EF4-FFF2-40B4-BE49-F238E27FC236}">
+                <a16:creationId xmlns:a16="http://schemas.microsoft.com/office/drawing/2014/main" id="{656944A9-8AB8-44A4-8CC0-C405ACBE94C4}"/>
+              </a:ext>
+            </a:extLst>
+          </p:cNvPr>
+          <p:cNvSpPr txBox="1"/>
+          <p:nvPr/>
+        </p:nvSpPr>
+        <p:spPr>
+          <a:xfrm>
+            <a:off x="1770136" y="1258888"/>
+            <a:ext cx="8651727" cy="369332"/>
+          </a:xfrm>
+          <a:prstGeom prst="rect">
+            <a:avLst/>
+          </a:prstGeom>
+          <a:noFill/>
+        </p:spPr>
+        <p:txBody>
+          <a:bodyPr wrap="none" rtlCol="0">
+            <a:spAutoFit/>
+          </a:bodyPr>
+          <a:lstStyle/>
+          <a:p>
+            <a:r>
+              <a:rPr lang="fr-FR" dirty="0"/>
+              <a:t>Récupération de l’historique des X dernières mesures faites toutes les heures</a:t>
+            </a:r>
+          </a:p>
+        </p:txBody>
+      </p:sp>
     </p:spTree>
     <p:extLst>
       <p:ext uri="{BB962C8B-B14F-4D97-AF65-F5344CB8AC3E}">
-        <p14:creationId xmlns:p14="http://schemas.microsoft.com/office/powerpoint/2010/main" val="4284754361"/>
+        <p14:creationId xmlns:p14="http://schemas.microsoft.com/office/powerpoint/2010/main" val="3950508307"/>
       </p:ext>
     </p:extLst>
   </p:cSld>
@@ -19496,10 +19582,10 @@
       </p:grpSpPr>
       <p:sp>
         <p:nvSpPr>
-          <p:cNvPr id="5" name="Titre 4">
-            <a:extLst>
-              <a:ext uri="{FF2B5EF4-FFF2-40B4-BE49-F238E27FC236}">
-                <a16:creationId xmlns:a16="http://schemas.microsoft.com/office/drawing/2014/main" id="{B535D397-2E1B-4C1E-A392-E2A43916D949}"/>
+          <p:cNvPr id="2" name="Titre 1">
+            <a:extLst>
+              <a:ext uri="{FF2B5EF4-FFF2-40B4-BE49-F238E27FC236}">
+                <a16:creationId xmlns:a16="http://schemas.microsoft.com/office/drawing/2014/main" id="{EA53D9FC-3044-40B7-A8EB-EAB80F26D6FE}"/>
               </a:ext>
             </a:extLst>
           </p:cNvPr>
@@ -19507,27 +19593,37 @@
             <a:spLocks noGrp="1"/>
           </p:cNvSpPr>
           <p:nvPr>
-            <p:ph type="ctrTitle"/>
+            <p:ph type="title"/>
           </p:nvPr>
         </p:nvSpPr>
         <p:spPr/>
         <p:txBody>
-          <a:bodyPr/>
-          <a:lstStyle/>
-          <a:p>
-            <a:r>
-              <a:rPr lang="fr-FR" dirty="0"/>
-              <a:t>LA FINITION</a:t>
-            </a:r>
-          </a:p>
-        </p:txBody>
-      </p:sp>
-      <p:sp>
-        <p:nvSpPr>
-          <p:cNvPr id="6" name="Sous-titre 5">
-            <a:extLst>
-              <a:ext uri="{FF2B5EF4-FFF2-40B4-BE49-F238E27FC236}">
-                <a16:creationId xmlns:a16="http://schemas.microsoft.com/office/drawing/2014/main" id="{42DF712F-84EC-48F3-B510-83E590DD97F0}"/>
+          <a:bodyPr>
+            <a:normAutofit/>
+          </a:bodyPr>
+          <a:lstStyle/>
+          <a:p>
+            <a:r>
+              <a:rPr lang="fr-FR" dirty="0"/>
+              <a:t>Conception </a:t>
+            </a:r>
+            <a:r>
+              <a:rPr lang="fr-FR" dirty="0" err="1"/>
+              <a:t>dU</a:t>
+            </a:r>
+            <a:r>
+              <a:rPr lang="fr-FR" dirty="0"/>
+              <a:t> Client</a:t>
+            </a:r>
+          </a:p>
+        </p:txBody>
+      </p:sp>
+      <p:sp>
+        <p:nvSpPr>
+          <p:cNvPr id="7" name="Espace réservé du texte 6">
+            <a:extLst>
+              <a:ext uri="{FF2B5EF4-FFF2-40B4-BE49-F238E27FC236}">
+                <a16:creationId xmlns:a16="http://schemas.microsoft.com/office/drawing/2014/main" id="{20C697DF-1E44-4814-A10D-46B212D46301}"/>
               </a:ext>
             </a:extLst>
           </p:cNvPr>
@@ -19535,7 +19631,7 @@
             <a:spLocks noGrp="1"/>
           </p:cNvSpPr>
           <p:nvPr>
-            <p:ph type="subTitle" idx="1"/>
+            <p:ph type="body" idx="1"/>
           </p:nvPr>
         </p:nvSpPr>
         <p:spPr/>
@@ -19543,10 +19639,7 @@
           <a:bodyPr/>
           <a:lstStyle/>
           <a:p>
-            <a:r>
-              <a:rPr lang="fr-FR" dirty="0"/>
-              <a:t>DESIGN / OPTIMISATION / SIMPLIFCATION</a:t>
-            </a:r>
+            <a:endParaRPr lang="fr-FR" dirty="0"/>
           </a:p>
         </p:txBody>
       </p:sp>
@@ -19555,7 +19648,7 @@
           <p:cNvPr id="4" name="Espace réservé de la date 3">
             <a:extLst>
               <a:ext uri="{FF2B5EF4-FFF2-40B4-BE49-F238E27FC236}">
-                <a16:creationId xmlns:a16="http://schemas.microsoft.com/office/drawing/2014/main" id="{030B0D3A-6441-43DC-BDBC-2E9EE16205E9}"/>
+                <a16:creationId xmlns:a16="http://schemas.microsoft.com/office/drawing/2014/main" id="{60BDC591-8D09-4D49-88A2-408CD1604F69}"/>
               </a:ext>
             </a:extLst>
           </p:cNvPr>
@@ -19583,7 +19676,7 @@
     </p:spTree>
     <p:extLst>
       <p:ext uri="{BB962C8B-B14F-4D97-AF65-F5344CB8AC3E}">
-        <p14:creationId xmlns:p14="http://schemas.microsoft.com/office/powerpoint/2010/main" val="1130815813"/>
+        <p14:creationId xmlns:p14="http://schemas.microsoft.com/office/powerpoint/2010/main" val="4284754361"/>
       </p:ext>
     </p:extLst>
   </p:cSld>
@@ -19633,6 +19726,122 @@
           <a:p>
             <a:r>
               <a:rPr lang="fr-FR" dirty="0"/>
+              <a:t>LA FINITION</a:t>
+            </a:r>
+          </a:p>
+        </p:txBody>
+      </p:sp>
+      <p:sp>
+        <p:nvSpPr>
+          <p:cNvPr id="6" name="Sous-titre 5">
+            <a:extLst>
+              <a:ext uri="{FF2B5EF4-FFF2-40B4-BE49-F238E27FC236}">
+                <a16:creationId xmlns:a16="http://schemas.microsoft.com/office/drawing/2014/main" id="{42DF712F-84EC-48F3-B510-83E590DD97F0}"/>
+              </a:ext>
+            </a:extLst>
+          </p:cNvPr>
+          <p:cNvSpPr>
+            <a:spLocks noGrp="1"/>
+          </p:cNvSpPr>
+          <p:nvPr>
+            <p:ph type="subTitle" idx="1"/>
+          </p:nvPr>
+        </p:nvSpPr>
+        <p:spPr/>
+        <p:txBody>
+          <a:bodyPr/>
+          <a:lstStyle/>
+          <a:p>
+            <a:r>
+              <a:rPr lang="fr-FR" dirty="0"/>
+              <a:t>DESIGN / OPTIMISATION / SIMPLIFCATION</a:t>
+            </a:r>
+          </a:p>
+        </p:txBody>
+      </p:sp>
+      <p:sp>
+        <p:nvSpPr>
+          <p:cNvPr id="4" name="Espace réservé de la date 3">
+            <a:extLst>
+              <a:ext uri="{FF2B5EF4-FFF2-40B4-BE49-F238E27FC236}">
+                <a16:creationId xmlns:a16="http://schemas.microsoft.com/office/drawing/2014/main" id="{030B0D3A-6441-43DC-BDBC-2E9EE16205E9}"/>
+              </a:ext>
+            </a:extLst>
+          </p:cNvPr>
+          <p:cNvSpPr>
+            <a:spLocks noGrp="1"/>
+          </p:cNvSpPr>
+          <p:nvPr>
+            <p:ph type="dt" sz="half" idx="10"/>
+          </p:nvPr>
+        </p:nvSpPr>
+        <p:spPr/>
+        <p:txBody>
+          <a:bodyPr/>
+          <a:lstStyle/>
+          <a:p>
+            <a:pPr rtl="0"/>
+            <a:fld id="{802FE938-1586-4780-B61A-DD3B60BAB93C}" type="datetime1">
+              <a:rPr lang="fr-FR" smtClean="0"/>
+              <a:t>22/06/2021</a:t>
+            </a:fld>
+            <a:endParaRPr lang="en-US"/>
+          </a:p>
+        </p:txBody>
+      </p:sp>
+    </p:spTree>
+    <p:extLst>
+      <p:ext uri="{BB962C8B-B14F-4D97-AF65-F5344CB8AC3E}">
+        <p14:creationId xmlns:p14="http://schemas.microsoft.com/office/powerpoint/2010/main" val="1130815813"/>
+      </p:ext>
+    </p:extLst>
+  </p:cSld>
+  <p:clrMapOvr>
+    <a:masterClrMapping/>
+  </p:clrMapOvr>
+</p:sld>
+</file>
+
+<file path=ppt/slides/slide42.xml><?xml version="1.0" encoding="utf-8"?>
+<p:sld xmlns:a="http://schemas.openxmlformats.org/drawingml/2006/main" xmlns:r="http://schemas.openxmlformats.org/officeDocument/2006/relationships" xmlns:p="http://schemas.openxmlformats.org/presentationml/2006/main">
+  <p:cSld>
+    <p:spTree>
+      <p:nvGrpSpPr>
+        <p:cNvPr id="1" name=""/>
+        <p:cNvGrpSpPr/>
+        <p:nvPr/>
+      </p:nvGrpSpPr>
+      <p:grpSpPr>
+        <a:xfrm>
+          <a:off x="0" y="0"/>
+          <a:ext cx="0" cy="0"/>
+          <a:chOff x="0" y="0"/>
+          <a:chExt cx="0" cy="0"/>
+        </a:xfrm>
+      </p:grpSpPr>
+      <p:sp>
+        <p:nvSpPr>
+          <p:cNvPr id="5" name="Titre 4">
+            <a:extLst>
+              <a:ext uri="{FF2B5EF4-FFF2-40B4-BE49-F238E27FC236}">
+                <a16:creationId xmlns:a16="http://schemas.microsoft.com/office/drawing/2014/main" id="{B535D397-2E1B-4C1E-A392-E2A43916D949}"/>
+              </a:ext>
+            </a:extLst>
+          </p:cNvPr>
+          <p:cNvSpPr>
+            <a:spLocks noGrp="1"/>
+          </p:cNvSpPr>
+          <p:nvPr>
+            <p:ph type="ctrTitle"/>
+          </p:nvPr>
+        </p:nvSpPr>
+        <p:spPr/>
+        <p:txBody>
+          <a:bodyPr/>
+          <a:lstStyle/>
+          <a:p>
+            <a:r>
+              <a:rPr lang="fr-FR" dirty="0"/>
               <a:t>DEMONSTRATION</a:t>
             </a:r>
           </a:p>
@@ -19709,7 +19918,7 @@
 </p:sld>
 </file>
 
-<file path=ppt/slides/slide42.xml><?xml version="1.0" encoding="utf-8"?>
+<file path=ppt/slides/slide43.xml><?xml version="1.0" encoding="utf-8"?>
 <p:sld xmlns:a="http://schemas.openxmlformats.org/drawingml/2006/main" xmlns:r="http://schemas.openxmlformats.org/officeDocument/2006/relationships" xmlns:p="http://schemas.openxmlformats.org/presentationml/2006/main">
   <p:cSld>
     <p:spTree>

</xml_diff>

<commit_message>
[UPD] : update of PPT, add unit measure change
</commit_message>
<xml_diff>
--- a/doc/StationMeteo_Soutenance_Stephane.pptx
+++ b/doc/StationMeteo_Soutenance_Stephane.pptx
@@ -22899,8 +22899,13 @@
           <a:p>
             <a:r>
               <a:rPr lang="fr-FR" sz="2800" dirty="0"/>
-              <a:t>Fonctionnalité : Interface D’administration</a:t>
-            </a:r>
+              <a:t>Fonctionnalité : Changement de </a:t>
+            </a:r>
+            <a:r>
+              <a:rPr lang="fr-FR" sz="2800"/>
+              <a:t>l’unité des mesures</a:t>
+            </a:r>
+            <a:endParaRPr lang="fr-FR" sz="2800" dirty="0"/>
           </a:p>
         </p:txBody>
       </p:sp>

</xml_diff>

<commit_message>
[UPD] : mise au point avec les autres sur le temps de paroles. [ADD] : ajout du pdf
</commit_message>
<xml_diff>
--- a/doc/StationMeteo_Soutenance_Stephane.pptx
+++ b/doc/StationMeteo_Soutenance_Stephane.pptx
@@ -8475,104 +8475,6 @@
           </a:p>
         </p:txBody>
       </p:sp>
-      <p:sp>
-        <p:nvSpPr>
-          <p:cNvPr id="11" name="Rectangle 10">
-            <a:extLst>
-              <a:ext uri="{FF2B5EF4-FFF2-40B4-BE49-F238E27FC236}">
-                <a16:creationId xmlns:a16="http://schemas.microsoft.com/office/drawing/2014/main" id="{D65D08F8-0083-46EA-A7AF-0C286B191548}"/>
-              </a:ext>
-            </a:extLst>
-          </p:cNvPr>
-          <p:cNvSpPr/>
-          <p:nvPr/>
-        </p:nvSpPr>
-        <p:spPr>
-          <a:xfrm>
-            <a:off x="571192" y="60578"/>
-            <a:ext cx="204040" cy="221152"/>
-          </a:xfrm>
-          <a:prstGeom prst="rect">
-            <a:avLst/>
-          </a:prstGeom>
-        </p:spPr>
-        <p:style>
-          <a:lnRef idx="2">
-            <a:schemeClr val="accent4">
-              <a:shade val="50000"/>
-            </a:schemeClr>
-          </a:lnRef>
-          <a:fillRef idx="1">
-            <a:schemeClr val="accent4"/>
-          </a:fillRef>
-          <a:effectRef idx="0">
-            <a:schemeClr val="accent4"/>
-          </a:effectRef>
-          <a:fontRef idx="minor">
-            <a:schemeClr val="lt1"/>
-          </a:fontRef>
-        </p:style>
-        <p:txBody>
-          <a:bodyPr rtlCol="0" anchor="ctr"/>
-          <a:lstStyle/>
-          <a:p>
-            <a:pPr algn="ctr"/>
-            <a:r>
-              <a:rPr lang="fr-FR" dirty="0"/>
-              <a:t>M</a:t>
-            </a:r>
-          </a:p>
-        </p:txBody>
-      </p:sp>
-      <p:sp>
-        <p:nvSpPr>
-          <p:cNvPr id="12" name="Rectangle 11">
-            <a:extLst>
-              <a:ext uri="{FF2B5EF4-FFF2-40B4-BE49-F238E27FC236}">
-                <a16:creationId xmlns:a16="http://schemas.microsoft.com/office/drawing/2014/main" id="{883C540E-220E-4AD1-A3F6-7E525ABE6D09}"/>
-              </a:ext>
-            </a:extLst>
-          </p:cNvPr>
-          <p:cNvSpPr/>
-          <p:nvPr/>
-        </p:nvSpPr>
-        <p:spPr>
-          <a:xfrm>
-            <a:off x="62352" y="60578"/>
-            <a:ext cx="204040" cy="221152"/>
-          </a:xfrm>
-          <a:prstGeom prst="rect">
-            <a:avLst/>
-          </a:prstGeom>
-        </p:spPr>
-        <p:style>
-          <a:lnRef idx="2">
-            <a:schemeClr val="accent1">
-              <a:shade val="50000"/>
-            </a:schemeClr>
-          </a:lnRef>
-          <a:fillRef idx="1">
-            <a:schemeClr val="accent1"/>
-          </a:fillRef>
-          <a:effectRef idx="0">
-            <a:schemeClr val="accent1"/>
-          </a:effectRef>
-          <a:fontRef idx="minor">
-            <a:schemeClr val="lt1"/>
-          </a:fontRef>
-        </p:style>
-        <p:txBody>
-          <a:bodyPr rtlCol="0" anchor="ctr"/>
-          <a:lstStyle/>
-          <a:p>
-            <a:pPr algn="ctr"/>
-            <a:r>
-              <a:rPr lang="fr-FR" dirty="0"/>
-              <a:t>S</a:t>
-            </a:r>
-          </a:p>
-        </p:txBody>
-      </p:sp>
     </p:spTree>
     <p:extLst>
       <p:ext uri="{BB962C8B-B14F-4D97-AF65-F5344CB8AC3E}">
@@ -13265,55 +13167,6 @@
       </p:sp>
       <p:sp>
         <p:nvSpPr>
-          <p:cNvPr id="7" name="Rectangle 6">
-            <a:extLst>
-              <a:ext uri="{FF2B5EF4-FFF2-40B4-BE49-F238E27FC236}">
-                <a16:creationId xmlns:a16="http://schemas.microsoft.com/office/drawing/2014/main" id="{3E043CF8-B5F1-4494-92C0-FE6A75B0405D}"/>
-              </a:ext>
-            </a:extLst>
-          </p:cNvPr>
-          <p:cNvSpPr/>
-          <p:nvPr/>
-        </p:nvSpPr>
-        <p:spPr>
-          <a:xfrm>
-            <a:off x="316772" y="60578"/>
-            <a:ext cx="204040" cy="221152"/>
-          </a:xfrm>
-          <a:prstGeom prst="rect">
-            <a:avLst/>
-          </a:prstGeom>
-        </p:spPr>
-        <p:style>
-          <a:lnRef idx="2">
-            <a:schemeClr val="accent3">
-              <a:shade val="50000"/>
-            </a:schemeClr>
-          </a:lnRef>
-          <a:fillRef idx="1">
-            <a:schemeClr val="accent3"/>
-          </a:fillRef>
-          <a:effectRef idx="0">
-            <a:schemeClr val="accent3"/>
-          </a:effectRef>
-          <a:fontRef idx="minor">
-            <a:schemeClr val="lt1"/>
-          </a:fontRef>
-        </p:style>
-        <p:txBody>
-          <a:bodyPr rtlCol="0" anchor="ctr"/>
-          <a:lstStyle/>
-          <a:p>
-            <a:pPr algn="ctr"/>
-            <a:r>
-              <a:rPr lang="fr-FR" dirty="0"/>
-              <a:t>L</a:t>
-            </a:r>
-          </a:p>
-        </p:txBody>
-      </p:sp>
-      <p:sp>
-        <p:nvSpPr>
           <p:cNvPr id="8" name="Rectangle 7">
             <a:extLst>
               <a:ext uri="{FF2B5EF4-FFF2-40B4-BE49-F238E27FC236}">
@@ -13357,55 +13210,6 @@
             <a:r>
               <a:rPr lang="fr-FR" dirty="0"/>
               <a:t>M</a:t>
-            </a:r>
-          </a:p>
-        </p:txBody>
-      </p:sp>
-      <p:sp>
-        <p:nvSpPr>
-          <p:cNvPr id="9" name="Rectangle 8">
-            <a:extLst>
-              <a:ext uri="{FF2B5EF4-FFF2-40B4-BE49-F238E27FC236}">
-                <a16:creationId xmlns:a16="http://schemas.microsoft.com/office/drawing/2014/main" id="{39129A79-1164-427F-8908-AC3E0DBD3843}"/>
-              </a:ext>
-            </a:extLst>
-          </p:cNvPr>
-          <p:cNvSpPr/>
-          <p:nvPr/>
-        </p:nvSpPr>
-        <p:spPr>
-          <a:xfrm>
-            <a:off x="62352" y="60578"/>
-            <a:ext cx="204040" cy="221152"/>
-          </a:xfrm>
-          <a:prstGeom prst="rect">
-            <a:avLst/>
-          </a:prstGeom>
-        </p:spPr>
-        <p:style>
-          <a:lnRef idx="2">
-            <a:schemeClr val="accent1">
-              <a:shade val="50000"/>
-            </a:schemeClr>
-          </a:lnRef>
-          <a:fillRef idx="1">
-            <a:schemeClr val="accent1"/>
-          </a:fillRef>
-          <a:effectRef idx="0">
-            <a:schemeClr val="accent1"/>
-          </a:effectRef>
-          <a:fontRef idx="minor">
-            <a:schemeClr val="lt1"/>
-          </a:fontRef>
-        </p:style>
-        <p:txBody>
-          <a:bodyPr rtlCol="0" anchor="ctr"/>
-          <a:lstStyle/>
-          <a:p>
-            <a:pPr algn="ctr"/>
-            <a:r>
-              <a:rPr lang="fr-FR" dirty="0"/>
-              <a:t>S</a:t>
             </a:r>
           </a:p>
         </p:txBody>
@@ -17344,55 +17148,6 @@
       </p:sp>
       <p:sp>
         <p:nvSpPr>
-          <p:cNvPr id="7" name="Rectangle 6">
-            <a:extLst>
-              <a:ext uri="{FF2B5EF4-FFF2-40B4-BE49-F238E27FC236}">
-                <a16:creationId xmlns:a16="http://schemas.microsoft.com/office/drawing/2014/main" id="{43B64B37-A2C7-421E-ABF1-7292730DC5B4}"/>
-              </a:ext>
-            </a:extLst>
-          </p:cNvPr>
-          <p:cNvSpPr/>
-          <p:nvPr/>
-        </p:nvSpPr>
-        <p:spPr>
-          <a:xfrm>
-            <a:off x="316772" y="60578"/>
-            <a:ext cx="204040" cy="221152"/>
-          </a:xfrm>
-          <a:prstGeom prst="rect">
-            <a:avLst/>
-          </a:prstGeom>
-        </p:spPr>
-        <p:style>
-          <a:lnRef idx="2">
-            <a:schemeClr val="accent3">
-              <a:shade val="50000"/>
-            </a:schemeClr>
-          </a:lnRef>
-          <a:fillRef idx="1">
-            <a:schemeClr val="accent3"/>
-          </a:fillRef>
-          <a:effectRef idx="0">
-            <a:schemeClr val="accent3"/>
-          </a:effectRef>
-          <a:fontRef idx="minor">
-            <a:schemeClr val="lt1"/>
-          </a:fontRef>
-        </p:style>
-        <p:txBody>
-          <a:bodyPr rtlCol="0" anchor="ctr"/>
-          <a:lstStyle/>
-          <a:p>
-            <a:pPr algn="ctr"/>
-            <a:r>
-              <a:rPr lang="fr-FR" dirty="0"/>
-              <a:t>L</a:t>
-            </a:r>
-          </a:p>
-        </p:txBody>
-      </p:sp>
-      <p:sp>
-        <p:nvSpPr>
           <p:cNvPr id="8" name="Rectangle 7">
             <a:extLst>
               <a:ext uri="{FF2B5EF4-FFF2-40B4-BE49-F238E27FC236}">
@@ -17436,55 +17191,6 @@
             <a:r>
               <a:rPr lang="fr-FR" dirty="0"/>
               <a:t>M</a:t>
-            </a:r>
-          </a:p>
-        </p:txBody>
-      </p:sp>
-      <p:sp>
-        <p:nvSpPr>
-          <p:cNvPr id="9" name="Rectangle 8">
-            <a:extLst>
-              <a:ext uri="{FF2B5EF4-FFF2-40B4-BE49-F238E27FC236}">
-                <a16:creationId xmlns:a16="http://schemas.microsoft.com/office/drawing/2014/main" id="{34EF972F-DBC2-42E2-8640-0D059069B0CC}"/>
-              </a:ext>
-            </a:extLst>
-          </p:cNvPr>
-          <p:cNvSpPr/>
-          <p:nvPr/>
-        </p:nvSpPr>
-        <p:spPr>
-          <a:xfrm>
-            <a:off x="62352" y="60578"/>
-            <a:ext cx="204040" cy="221152"/>
-          </a:xfrm>
-          <a:prstGeom prst="rect">
-            <a:avLst/>
-          </a:prstGeom>
-        </p:spPr>
-        <p:style>
-          <a:lnRef idx="2">
-            <a:schemeClr val="accent1">
-              <a:shade val="50000"/>
-            </a:schemeClr>
-          </a:lnRef>
-          <a:fillRef idx="1">
-            <a:schemeClr val="accent1"/>
-          </a:fillRef>
-          <a:effectRef idx="0">
-            <a:schemeClr val="accent1"/>
-          </a:effectRef>
-          <a:fontRef idx="minor">
-            <a:schemeClr val="lt1"/>
-          </a:fontRef>
-        </p:style>
-        <p:txBody>
-          <a:bodyPr rtlCol="0" anchor="ctr"/>
-          <a:lstStyle/>
-          <a:p>
-            <a:pPr algn="ctr"/>
-            <a:r>
-              <a:rPr lang="fr-FR" dirty="0"/>
-              <a:t>S</a:t>
             </a:r>
           </a:p>
         </p:txBody>
@@ -17761,55 +17467,6 @@
       </p:sp>
       <p:sp>
         <p:nvSpPr>
-          <p:cNvPr id="5" name="Rectangle 4">
-            <a:extLst>
-              <a:ext uri="{FF2B5EF4-FFF2-40B4-BE49-F238E27FC236}">
-                <a16:creationId xmlns:a16="http://schemas.microsoft.com/office/drawing/2014/main" id="{68C57BE3-281C-4E98-9E21-9DF392EB0B38}"/>
-              </a:ext>
-            </a:extLst>
-          </p:cNvPr>
-          <p:cNvSpPr/>
-          <p:nvPr/>
-        </p:nvSpPr>
-        <p:spPr>
-          <a:xfrm>
-            <a:off x="316772" y="60578"/>
-            <a:ext cx="204040" cy="221152"/>
-          </a:xfrm>
-          <a:prstGeom prst="rect">
-            <a:avLst/>
-          </a:prstGeom>
-        </p:spPr>
-        <p:style>
-          <a:lnRef idx="2">
-            <a:schemeClr val="accent3">
-              <a:shade val="50000"/>
-            </a:schemeClr>
-          </a:lnRef>
-          <a:fillRef idx="1">
-            <a:schemeClr val="accent3"/>
-          </a:fillRef>
-          <a:effectRef idx="0">
-            <a:schemeClr val="accent3"/>
-          </a:effectRef>
-          <a:fontRef idx="minor">
-            <a:schemeClr val="lt1"/>
-          </a:fontRef>
-        </p:style>
-        <p:txBody>
-          <a:bodyPr rtlCol="0" anchor="ctr"/>
-          <a:lstStyle/>
-          <a:p>
-            <a:pPr algn="ctr"/>
-            <a:r>
-              <a:rPr lang="fr-FR" dirty="0"/>
-              <a:t>L</a:t>
-            </a:r>
-          </a:p>
-        </p:txBody>
-      </p:sp>
-      <p:sp>
-        <p:nvSpPr>
           <p:cNvPr id="6" name="Rectangle 5">
             <a:extLst>
               <a:ext uri="{FF2B5EF4-FFF2-40B4-BE49-F238E27FC236}">
@@ -17853,55 +17510,6 @@
             <a:r>
               <a:rPr lang="fr-FR" dirty="0"/>
               <a:t>M</a:t>
-            </a:r>
-          </a:p>
-        </p:txBody>
-      </p:sp>
-      <p:sp>
-        <p:nvSpPr>
-          <p:cNvPr id="8" name="Rectangle 7">
-            <a:extLst>
-              <a:ext uri="{FF2B5EF4-FFF2-40B4-BE49-F238E27FC236}">
-                <a16:creationId xmlns:a16="http://schemas.microsoft.com/office/drawing/2014/main" id="{8B89EF85-587F-49D4-ADE7-E79988A80B60}"/>
-              </a:ext>
-            </a:extLst>
-          </p:cNvPr>
-          <p:cNvSpPr/>
-          <p:nvPr/>
-        </p:nvSpPr>
-        <p:spPr>
-          <a:xfrm>
-            <a:off x="62352" y="60578"/>
-            <a:ext cx="204040" cy="221152"/>
-          </a:xfrm>
-          <a:prstGeom prst="rect">
-            <a:avLst/>
-          </a:prstGeom>
-        </p:spPr>
-        <p:style>
-          <a:lnRef idx="2">
-            <a:schemeClr val="accent1">
-              <a:shade val="50000"/>
-            </a:schemeClr>
-          </a:lnRef>
-          <a:fillRef idx="1">
-            <a:schemeClr val="accent1"/>
-          </a:fillRef>
-          <a:effectRef idx="0">
-            <a:schemeClr val="accent1"/>
-          </a:effectRef>
-          <a:fontRef idx="minor">
-            <a:schemeClr val="lt1"/>
-          </a:fontRef>
-        </p:style>
-        <p:txBody>
-          <a:bodyPr rtlCol="0" anchor="ctr"/>
-          <a:lstStyle/>
-          <a:p>
-            <a:pPr algn="ctr"/>
-            <a:r>
-              <a:rPr lang="fr-FR" dirty="0"/>
-              <a:t>S</a:t>
             </a:r>
           </a:p>
         </p:txBody>
@@ -21590,104 +21198,6 @@
             <a:r>
               <a:rPr lang="fr-FR" dirty="0"/>
               <a:t>L</a:t>
-            </a:r>
-          </a:p>
-        </p:txBody>
-      </p:sp>
-      <p:sp>
-        <p:nvSpPr>
-          <p:cNvPr id="6" name="Rectangle 5">
-            <a:extLst>
-              <a:ext uri="{FF2B5EF4-FFF2-40B4-BE49-F238E27FC236}">
-                <a16:creationId xmlns:a16="http://schemas.microsoft.com/office/drawing/2014/main" id="{09B51015-DCD5-476E-B71D-AA12AADE7DCA}"/>
-              </a:ext>
-            </a:extLst>
-          </p:cNvPr>
-          <p:cNvSpPr/>
-          <p:nvPr/>
-        </p:nvSpPr>
-        <p:spPr>
-          <a:xfrm>
-            <a:off x="571192" y="60578"/>
-            <a:ext cx="204040" cy="221152"/>
-          </a:xfrm>
-          <a:prstGeom prst="rect">
-            <a:avLst/>
-          </a:prstGeom>
-        </p:spPr>
-        <p:style>
-          <a:lnRef idx="2">
-            <a:schemeClr val="accent4">
-              <a:shade val="50000"/>
-            </a:schemeClr>
-          </a:lnRef>
-          <a:fillRef idx="1">
-            <a:schemeClr val="accent4"/>
-          </a:fillRef>
-          <a:effectRef idx="0">
-            <a:schemeClr val="accent4"/>
-          </a:effectRef>
-          <a:fontRef idx="minor">
-            <a:schemeClr val="lt1"/>
-          </a:fontRef>
-        </p:style>
-        <p:txBody>
-          <a:bodyPr rtlCol="0" anchor="ctr"/>
-          <a:lstStyle/>
-          <a:p>
-            <a:pPr algn="ctr"/>
-            <a:r>
-              <a:rPr lang="fr-FR" dirty="0"/>
-              <a:t>M</a:t>
-            </a:r>
-          </a:p>
-        </p:txBody>
-      </p:sp>
-      <p:sp>
-        <p:nvSpPr>
-          <p:cNvPr id="8" name="Rectangle 7">
-            <a:extLst>
-              <a:ext uri="{FF2B5EF4-FFF2-40B4-BE49-F238E27FC236}">
-                <a16:creationId xmlns:a16="http://schemas.microsoft.com/office/drawing/2014/main" id="{86309D13-ACFB-4485-B5B5-5B1543806604}"/>
-              </a:ext>
-            </a:extLst>
-          </p:cNvPr>
-          <p:cNvSpPr/>
-          <p:nvPr/>
-        </p:nvSpPr>
-        <p:spPr>
-          <a:xfrm>
-            <a:off x="62352" y="60578"/>
-            <a:ext cx="204040" cy="221152"/>
-          </a:xfrm>
-          <a:prstGeom prst="rect">
-            <a:avLst/>
-          </a:prstGeom>
-        </p:spPr>
-        <p:style>
-          <a:lnRef idx="2">
-            <a:schemeClr val="accent1">
-              <a:shade val="50000"/>
-            </a:schemeClr>
-          </a:lnRef>
-          <a:fillRef idx="1">
-            <a:schemeClr val="accent1"/>
-          </a:fillRef>
-          <a:effectRef idx="0">
-            <a:schemeClr val="accent1"/>
-          </a:effectRef>
-          <a:fontRef idx="minor">
-            <a:schemeClr val="lt1"/>
-          </a:fontRef>
-        </p:style>
-        <p:txBody>
-          <a:bodyPr rtlCol="0" anchor="ctr"/>
-          <a:lstStyle/>
-          <a:p>
-            <a:pPr algn="ctr"/>
-            <a:r>
-              <a:rPr lang="fr-FR" dirty="0"/>
-              <a:t>S</a:t>
             </a:r>
           </a:p>
         </p:txBody>
@@ -24504,104 +24014,6 @@
           </a:p>
         </p:txBody>
       </p:sp>
-      <p:sp>
-        <p:nvSpPr>
-          <p:cNvPr id="6" name="Rectangle 5">
-            <a:extLst>
-              <a:ext uri="{FF2B5EF4-FFF2-40B4-BE49-F238E27FC236}">
-                <a16:creationId xmlns:a16="http://schemas.microsoft.com/office/drawing/2014/main" id="{8F666035-38DF-4226-A118-AB46C2CB09B1}"/>
-              </a:ext>
-            </a:extLst>
-          </p:cNvPr>
-          <p:cNvSpPr/>
-          <p:nvPr/>
-        </p:nvSpPr>
-        <p:spPr>
-          <a:xfrm>
-            <a:off x="926792" y="421442"/>
-            <a:ext cx="204040" cy="221152"/>
-          </a:xfrm>
-          <a:prstGeom prst="rect">
-            <a:avLst/>
-          </a:prstGeom>
-        </p:spPr>
-        <p:style>
-          <a:lnRef idx="2">
-            <a:schemeClr val="accent4">
-              <a:shade val="50000"/>
-            </a:schemeClr>
-          </a:lnRef>
-          <a:fillRef idx="1">
-            <a:schemeClr val="accent4"/>
-          </a:fillRef>
-          <a:effectRef idx="0">
-            <a:schemeClr val="accent4"/>
-          </a:effectRef>
-          <a:fontRef idx="minor">
-            <a:schemeClr val="lt1"/>
-          </a:fontRef>
-        </p:style>
-        <p:txBody>
-          <a:bodyPr rtlCol="0" anchor="ctr"/>
-          <a:lstStyle/>
-          <a:p>
-            <a:pPr algn="ctr"/>
-            <a:r>
-              <a:rPr lang="fr-FR" dirty="0"/>
-              <a:t>M</a:t>
-            </a:r>
-          </a:p>
-        </p:txBody>
-      </p:sp>
-      <p:sp>
-        <p:nvSpPr>
-          <p:cNvPr id="7" name="Rectangle 6">
-            <a:extLst>
-              <a:ext uri="{FF2B5EF4-FFF2-40B4-BE49-F238E27FC236}">
-                <a16:creationId xmlns:a16="http://schemas.microsoft.com/office/drawing/2014/main" id="{DEF10958-E530-43ED-BEF2-9845F3467F61}"/>
-              </a:ext>
-            </a:extLst>
-          </p:cNvPr>
-          <p:cNvSpPr/>
-          <p:nvPr/>
-        </p:nvSpPr>
-        <p:spPr>
-          <a:xfrm>
-            <a:off x="417952" y="421442"/>
-            <a:ext cx="204040" cy="221152"/>
-          </a:xfrm>
-          <a:prstGeom prst="rect">
-            <a:avLst/>
-          </a:prstGeom>
-        </p:spPr>
-        <p:style>
-          <a:lnRef idx="2">
-            <a:schemeClr val="accent1">
-              <a:shade val="50000"/>
-            </a:schemeClr>
-          </a:lnRef>
-          <a:fillRef idx="1">
-            <a:schemeClr val="accent1"/>
-          </a:fillRef>
-          <a:effectRef idx="0">
-            <a:schemeClr val="accent1"/>
-          </a:effectRef>
-          <a:fontRef idx="minor">
-            <a:schemeClr val="lt1"/>
-          </a:fontRef>
-        </p:style>
-        <p:txBody>
-          <a:bodyPr rtlCol="0" anchor="ctr"/>
-          <a:lstStyle/>
-          <a:p>
-            <a:pPr algn="ctr"/>
-            <a:r>
-              <a:rPr lang="fr-FR" dirty="0"/>
-              <a:t>S</a:t>
-            </a:r>
-          </a:p>
-        </p:txBody>
-      </p:sp>
     </p:spTree>
     <p:extLst>
       <p:ext uri="{BB962C8B-B14F-4D97-AF65-F5344CB8AC3E}">
@@ -29901,104 +29313,6 @@
             <a:r>
               <a:rPr lang="fr-FR" dirty="0"/>
               <a:t>L</a:t>
-            </a:r>
-          </a:p>
-        </p:txBody>
-      </p:sp>
-      <p:sp>
-        <p:nvSpPr>
-          <p:cNvPr id="7" name="Rectangle 6">
-            <a:extLst>
-              <a:ext uri="{FF2B5EF4-FFF2-40B4-BE49-F238E27FC236}">
-                <a16:creationId xmlns:a16="http://schemas.microsoft.com/office/drawing/2014/main" id="{4BD320E1-D5D4-4FE8-9029-969E4999BE70}"/>
-              </a:ext>
-            </a:extLst>
-          </p:cNvPr>
-          <p:cNvSpPr/>
-          <p:nvPr/>
-        </p:nvSpPr>
-        <p:spPr>
-          <a:xfrm>
-            <a:off x="571192" y="60578"/>
-            <a:ext cx="204040" cy="221152"/>
-          </a:xfrm>
-          <a:prstGeom prst="rect">
-            <a:avLst/>
-          </a:prstGeom>
-        </p:spPr>
-        <p:style>
-          <a:lnRef idx="2">
-            <a:schemeClr val="accent4">
-              <a:shade val="50000"/>
-            </a:schemeClr>
-          </a:lnRef>
-          <a:fillRef idx="1">
-            <a:schemeClr val="accent4"/>
-          </a:fillRef>
-          <a:effectRef idx="0">
-            <a:schemeClr val="accent4"/>
-          </a:effectRef>
-          <a:fontRef idx="minor">
-            <a:schemeClr val="lt1"/>
-          </a:fontRef>
-        </p:style>
-        <p:txBody>
-          <a:bodyPr rtlCol="0" anchor="ctr"/>
-          <a:lstStyle/>
-          <a:p>
-            <a:pPr algn="ctr"/>
-            <a:r>
-              <a:rPr lang="fr-FR" dirty="0"/>
-              <a:t>M</a:t>
-            </a:r>
-          </a:p>
-        </p:txBody>
-      </p:sp>
-      <p:sp>
-        <p:nvSpPr>
-          <p:cNvPr id="8" name="Rectangle 7">
-            <a:extLst>
-              <a:ext uri="{FF2B5EF4-FFF2-40B4-BE49-F238E27FC236}">
-                <a16:creationId xmlns:a16="http://schemas.microsoft.com/office/drawing/2014/main" id="{5949C3C6-E512-47D2-B55E-B286B02316E5}"/>
-              </a:ext>
-            </a:extLst>
-          </p:cNvPr>
-          <p:cNvSpPr/>
-          <p:nvPr/>
-        </p:nvSpPr>
-        <p:spPr>
-          <a:xfrm>
-            <a:off x="62352" y="60578"/>
-            <a:ext cx="204040" cy="221152"/>
-          </a:xfrm>
-          <a:prstGeom prst="rect">
-            <a:avLst/>
-          </a:prstGeom>
-        </p:spPr>
-        <p:style>
-          <a:lnRef idx="2">
-            <a:schemeClr val="accent1">
-              <a:shade val="50000"/>
-            </a:schemeClr>
-          </a:lnRef>
-          <a:fillRef idx="1">
-            <a:schemeClr val="accent1"/>
-          </a:fillRef>
-          <a:effectRef idx="0">
-            <a:schemeClr val="accent1"/>
-          </a:effectRef>
-          <a:fontRef idx="minor">
-            <a:schemeClr val="lt1"/>
-          </a:fontRef>
-        </p:style>
-        <p:txBody>
-          <a:bodyPr rtlCol="0" anchor="ctr"/>
-          <a:lstStyle/>
-          <a:p>
-            <a:pPr algn="ctr"/>
-            <a:r>
-              <a:rPr lang="fr-FR" dirty="0"/>
-              <a:t>S</a:t>
             </a:r>
           </a:p>
         </p:txBody>
@@ -33547,55 +32861,6 @@
       </p:sp>
       <p:sp>
         <p:nvSpPr>
-          <p:cNvPr id="7" name="Rectangle 6">
-            <a:extLst>
-              <a:ext uri="{FF2B5EF4-FFF2-40B4-BE49-F238E27FC236}">
-                <a16:creationId xmlns:a16="http://schemas.microsoft.com/office/drawing/2014/main" id="{40C53901-65DE-4F02-9B4E-C3B04CE1DF53}"/>
-              </a:ext>
-            </a:extLst>
-          </p:cNvPr>
-          <p:cNvSpPr/>
-          <p:nvPr/>
-        </p:nvSpPr>
-        <p:spPr>
-          <a:xfrm>
-            <a:off x="316772" y="60578"/>
-            <a:ext cx="204040" cy="221152"/>
-          </a:xfrm>
-          <a:prstGeom prst="rect">
-            <a:avLst/>
-          </a:prstGeom>
-        </p:spPr>
-        <p:style>
-          <a:lnRef idx="2">
-            <a:schemeClr val="accent3">
-              <a:shade val="50000"/>
-            </a:schemeClr>
-          </a:lnRef>
-          <a:fillRef idx="1">
-            <a:schemeClr val="accent3"/>
-          </a:fillRef>
-          <a:effectRef idx="0">
-            <a:schemeClr val="accent3"/>
-          </a:effectRef>
-          <a:fontRef idx="minor">
-            <a:schemeClr val="lt1"/>
-          </a:fontRef>
-        </p:style>
-        <p:txBody>
-          <a:bodyPr rtlCol="0" anchor="ctr"/>
-          <a:lstStyle/>
-          <a:p>
-            <a:pPr algn="ctr"/>
-            <a:r>
-              <a:rPr lang="fr-FR" dirty="0"/>
-              <a:t>L</a:t>
-            </a:r>
-          </a:p>
-        </p:txBody>
-      </p:sp>
-      <p:sp>
-        <p:nvSpPr>
           <p:cNvPr id="8" name="Rectangle 7">
             <a:extLst>
               <a:ext uri="{FF2B5EF4-FFF2-40B4-BE49-F238E27FC236}">
@@ -33639,55 +32904,6 @@
             <a:r>
               <a:rPr lang="fr-FR" dirty="0"/>
               <a:t>M</a:t>
-            </a:r>
-          </a:p>
-        </p:txBody>
-      </p:sp>
-      <p:sp>
-        <p:nvSpPr>
-          <p:cNvPr id="9" name="Rectangle 8">
-            <a:extLst>
-              <a:ext uri="{FF2B5EF4-FFF2-40B4-BE49-F238E27FC236}">
-                <a16:creationId xmlns:a16="http://schemas.microsoft.com/office/drawing/2014/main" id="{E8021E37-34C3-469E-A33B-1E57300FAE84}"/>
-              </a:ext>
-            </a:extLst>
-          </p:cNvPr>
-          <p:cNvSpPr/>
-          <p:nvPr/>
-        </p:nvSpPr>
-        <p:spPr>
-          <a:xfrm>
-            <a:off x="62352" y="60578"/>
-            <a:ext cx="204040" cy="221152"/>
-          </a:xfrm>
-          <a:prstGeom prst="rect">
-            <a:avLst/>
-          </a:prstGeom>
-        </p:spPr>
-        <p:style>
-          <a:lnRef idx="2">
-            <a:schemeClr val="accent1">
-              <a:shade val="50000"/>
-            </a:schemeClr>
-          </a:lnRef>
-          <a:fillRef idx="1">
-            <a:schemeClr val="accent1"/>
-          </a:fillRef>
-          <a:effectRef idx="0">
-            <a:schemeClr val="accent1"/>
-          </a:effectRef>
-          <a:fontRef idx="minor">
-            <a:schemeClr val="lt1"/>
-          </a:fontRef>
-        </p:style>
-        <p:txBody>
-          <a:bodyPr rtlCol="0" anchor="ctr"/>
-          <a:lstStyle/>
-          <a:p>
-            <a:pPr algn="ctr"/>
-            <a:r>
-              <a:rPr lang="fr-FR" dirty="0"/>
-              <a:t>S</a:t>
             </a:r>
           </a:p>
         </p:txBody>
@@ -35053,104 +34269,6 @@
           </a:p>
         </p:txBody>
       </p:sp>
-      <p:sp>
-        <p:nvSpPr>
-          <p:cNvPr id="8" name="Rectangle 7">
-            <a:extLst>
-              <a:ext uri="{FF2B5EF4-FFF2-40B4-BE49-F238E27FC236}">
-                <a16:creationId xmlns:a16="http://schemas.microsoft.com/office/drawing/2014/main" id="{B360839B-7F43-4FFF-9D17-1E6ED638B740}"/>
-              </a:ext>
-            </a:extLst>
-          </p:cNvPr>
-          <p:cNvSpPr/>
-          <p:nvPr/>
-        </p:nvSpPr>
-        <p:spPr>
-          <a:xfrm>
-            <a:off x="571192" y="60578"/>
-            <a:ext cx="204040" cy="221152"/>
-          </a:xfrm>
-          <a:prstGeom prst="rect">
-            <a:avLst/>
-          </a:prstGeom>
-        </p:spPr>
-        <p:style>
-          <a:lnRef idx="2">
-            <a:schemeClr val="accent4">
-              <a:shade val="50000"/>
-            </a:schemeClr>
-          </a:lnRef>
-          <a:fillRef idx="1">
-            <a:schemeClr val="accent4"/>
-          </a:fillRef>
-          <a:effectRef idx="0">
-            <a:schemeClr val="accent4"/>
-          </a:effectRef>
-          <a:fontRef idx="minor">
-            <a:schemeClr val="lt1"/>
-          </a:fontRef>
-        </p:style>
-        <p:txBody>
-          <a:bodyPr rtlCol="0" anchor="ctr"/>
-          <a:lstStyle/>
-          <a:p>
-            <a:pPr algn="ctr"/>
-            <a:r>
-              <a:rPr lang="fr-FR" dirty="0"/>
-              <a:t>M</a:t>
-            </a:r>
-          </a:p>
-        </p:txBody>
-      </p:sp>
-      <p:sp>
-        <p:nvSpPr>
-          <p:cNvPr id="9" name="Rectangle 8">
-            <a:extLst>
-              <a:ext uri="{FF2B5EF4-FFF2-40B4-BE49-F238E27FC236}">
-                <a16:creationId xmlns:a16="http://schemas.microsoft.com/office/drawing/2014/main" id="{F129A79B-ADE0-422E-BEC3-9D6F156F6A83}"/>
-              </a:ext>
-            </a:extLst>
-          </p:cNvPr>
-          <p:cNvSpPr/>
-          <p:nvPr/>
-        </p:nvSpPr>
-        <p:spPr>
-          <a:xfrm>
-            <a:off x="62352" y="60578"/>
-            <a:ext cx="204040" cy="221152"/>
-          </a:xfrm>
-          <a:prstGeom prst="rect">
-            <a:avLst/>
-          </a:prstGeom>
-        </p:spPr>
-        <p:style>
-          <a:lnRef idx="2">
-            <a:schemeClr val="accent1">
-              <a:shade val="50000"/>
-            </a:schemeClr>
-          </a:lnRef>
-          <a:fillRef idx="1">
-            <a:schemeClr val="accent1"/>
-          </a:fillRef>
-          <a:effectRef idx="0">
-            <a:schemeClr val="accent1"/>
-          </a:effectRef>
-          <a:fontRef idx="minor">
-            <a:schemeClr val="lt1"/>
-          </a:fontRef>
-        </p:style>
-        <p:txBody>
-          <a:bodyPr rtlCol="0" anchor="ctr"/>
-          <a:lstStyle/>
-          <a:p>
-            <a:pPr algn="ctr"/>
-            <a:r>
-              <a:rPr lang="fr-FR" dirty="0"/>
-              <a:t>S</a:t>
-            </a:r>
-          </a:p>
-        </p:txBody>
-      </p:sp>
     </p:spTree>
     <p:extLst>
       <p:ext uri="{BB962C8B-B14F-4D97-AF65-F5344CB8AC3E}">
@@ -35957,104 +35075,6 @@
           </a:p>
         </p:txBody>
       </p:sp>
-      <p:sp>
-        <p:nvSpPr>
-          <p:cNvPr id="8" name="Rectangle 7">
-            <a:extLst>
-              <a:ext uri="{FF2B5EF4-FFF2-40B4-BE49-F238E27FC236}">
-                <a16:creationId xmlns:a16="http://schemas.microsoft.com/office/drawing/2014/main" id="{270AB36B-22A2-4964-8A30-59582A075C4B}"/>
-              </a:ext>
-            </a:extLst>
-          </p:cNvPr>
-          <p:cNvSpPr/>
-          <p:nvPr/>
-        </p:nvSpPr>
-        <p:spPr>
-          <a:xfrm>
-            <a:off x="571192" y="60578"/>
-            <a:ext cx="204040" cy="221152"/>
-          </a:xfrm>
-          <a:prstGeom prst="rect">
-            <a:avLst/>
-          </a:prstGeom>
-        </p:spPr>
-        <p:style>
-          <a:lnRef idx="2">
-            <a:schemeClr val="accent4">
-              <a:shade val="50000"/>
-            </a:schemeClr>
-          </a:lnRef>
-          <a:fillRef idx="1">
-            <a:schemeClr val="accent4"/>
-          </a:fillRef>
-          <a:effectRef idx="0">
-            <a:schemeClr val="accent4"/>
-          </a:effectRef>
-          <a:fontRef idx="minor">
-            <a:schemeClr val="lt1"/>
-          </a:fontRef>
-        </p:style>
-        <p:txBody>
-          <a:bodyPr rtlCol="0" anchor="ctr"/>
-          <a:lstStyle/>
-          <a:p>
-            <a:pPr algn="ctr"/>
-            <a:r>
-              <a:rPr lang="fr-FR" dirty="0"/>
-              <a:t>M</a:t>
-            </a:r>
-          </a:p>
-        </p:txBody>
-      </p:sp>
-      <p:sp>
-        <p:nvSpPr>
-          <p:cNvPr id="9" name="Rectangle 8">
-            <a:extLst>
-              <a:ext uri="{FF2B5EF4-FFF2-40B4-BE49-F238E27FC236}">
-                <a16:creationId xmlns:a16="http://schemas.microsoft.com/office/drawing/2014/main" id="{BF0F5B57-1F9A-4057-A5BD-21029EFD7B3D}"/>
-              </a:ext>
-            </a:extLst>
-          </p:cNvPr>
-          <p:cNvSpPr/>
-          <p:nvPr/>
-        </p:nvSpPr>
-        <p:spPr>
-          <a:xfrm>
-            <a:off x="62352" y="60578"/>
-            <a:ext cx="204040" cy="221152"/>
-          </a:xfrm>
-          <a:prstGeom prst="rect">
-            <a:avLst/>
-          </a:prstGeom>
-        </p:spPr>
-        <p:style>
-          <a:lnRef idx="2">
-            <a:schemeClr val="accent1">
-              <a:shade val="50000"/>
-            </a:schemeClr>
-          </a:lnRef>
-          <a:fillRef idx="1">
-            <a:schemeClr val="accent1"/>
-          </a:fillRef>
-          <a:effectRef idx="0">
-            <a:schemeClr val="accent1"/>
-          </a:effectRef>
-          <a:fontRef idx="minor">
-            <a:schemeClr val="lt1"/>
-          </a:fontRef>
-        </p:style>
-        <p:txBody>
-          <a:bodyPr rtlCol="0" anchor="ctr"/>
-          <a:lstStyle/>
-          <a:p>
-            <a:pPr algn="ctr"/>
-            <a:r>
-              <a:rPr lang="fr-FR" dirty="0"/>
-              <a:t>S</a:t>
-            </a:r>
-          </a:p>
-        </p:txBody>
-      </p:sp>
     </p:spTree>
     <p:extLst>
       <p:ext uri="{BB962C8B-B14F-4D97-AF65-F5344CB8AC3E}">
@@ -36471,104 +35491,6 @@
               <a:t>24/06/2021</a:t>
             </a:fld>
             <a:endParaRPr lang="en-US"/>
-          </a:p>
-        </p:txBody>
-      </p:sp>
-      <p:sp>
-        <p:nvSpPr>
-          <p:cNvPr id="7" name="Rectangle 6">
-            <a:extLst>
-              <a:ext uri="{FF2B5EF4-FFF2-40B4-BE49-F238E27FC236}">
-                <a16:creationId xmlns:a16="http://schemas.microsoft.com/office/drawing/2014/main" id="{15B31F94-63E1-4B16-823D-79516306879D}"/>
-              </a:ext>
-            </a:extLst>
-          </p:cNvPr>
-          <p:cNvSpPr/>
-          <p:nvPr/>
-        </p:nvSpPr>
-        <p:spPr>
-          <a:xfrm>
-            <a:off x="316772" y="60578"/>
-            <a:ext cx="204040" cy="221152"/>
-          </a:xfrm>
-          <a:prstGeom prst="rect">
-            <a:avLst/>
-          </a:prstGeom>
-        </p:spPr>
-        <p:style>
-          <a:lnRef idx="2">
-            <a:schemeClr val="accent3">
-              <a:shade val="50000"/>
-            </a:schemeClr>
-          </a:lnRef>
-          <a:fillRef idx="1">
-            <a:schemeClr val="accent3"/>
-          </a:fillRef>
-          <a:effectRef idx="0">
-            <a:schemeClr val="accent3"/>
-          </a:effectRef>
-          <a:fontRef idx="minor">
-            <a:schemeClr val="lt1"/>
-          </a:fontRef>
-        </p:style>
-        <p:txBody>
-          <a:bodyPr rtlCol="0" anchor="ctr"/>
-          <a:lstStyle/>
-          <a:p>
-            <a:pPr algn="ctr"/>
-            <a:r>
-              <a:rPr lang="fr-FR" dirty="0"/>
-              <a:t>L</a:t>
-            </a:r>
-          </a:p>
-        </p:txBody>
-      </p:sp>
-      <p:sp>
-        <p:nvSpPr>
-          <p:cNvPr id="8" name="Rectangle 7">
-            <a:extLst>
-              <a:ext uri="{FF2B5EF4-FFF2-40B4-BE49-F238E27FC236}">
-                <a16:creationId xmlns:a16="http://schemas.microsoft.com/office/drawing/2014/main" id="{AE85C1DE-B08E-4ED5-A280-1538AA9B6A7F}"/>
-              </a:ext>
-            </a:extLst>
-          </p:cNvPr>
-          <p:cNvSpPr/>
-          <p:nvPr/>
-        </p:nvSpPr>
-        <p:spPr>
-          <a:xfrm>
-            <a:off x="571192" y="60578"/>
-            <a:ext cx="204040" cy="221152"/>
-          </a:xfrm>
-          <a:prstGeom prst="rect">
-            <a:avLst/>
-          </a:prstGeom>
-        </p:spPr>
-        <p:style>
-          <a:lnRef idx="2">
-            <a:schemeClr val="accent4">
-              <a:shade val="50000"/>
-            </a:schemeClr>
-          </a:lnRef>
-          <a:fillRef idx="1">
-            <a:schemeClr val="accent4"/>
-          </a:fillRef>
-          <a:effectRef idx="0">
-            <a:schemeClr val="accent4"/>
-          </a:effectRef>
-          <a:fontRef idx="minor">
-            <a:schemeClr val="lt1"/>
-          </a:fontRef>
-        </p:style>
-        <p:txBody>
-          <a:bodyPr rtlCol="0" anchor="ctr"/>
-          <a:lstStyle/>
-          <a:p>
-            <a:pPr algn="ctr"/>
-            <a:r>
-              <a:rPr lang="fr-FR" dirty="0"/>
-              <a:t>M</a:t>
-            </a:r>
           </a:p>
         </p:txBody>
       </p:sp>

</xml_diff>